<commit_message>
updated proposal with answers, adding screenshots
</commit_message>
<xml_diff>
--- a/Proposal.pptx
+++ b/Proposal.pptx
@@ -304,6 +304,11 @@
       </a:defRPr>
     </a:lvl9pPr>
   </p:defaultTextStyle>
+  <p:extLst>
+    <p:ext uri="{EFAFB233-063F-42B5-8137-9DF3F51BA10A}">
+      <p15:sldGuideLst xmlns:p15="http://schemas.microsoft.com/office/powerpoint/2012/main"/>
+    </p:ext>
+  </p:extLst>
 </p:presentation>
 </file>
 
@@ -1093,8 +1098,8 @@
         </p:nvSpPr>
         <p:spPr>
           <a:xfrm>
-            <a:off x="2104459" y="685800"/>
-            <a:ext cx="2649600" cy="3429000"/>
+            <a:off x="2105025" y="685800"/>
+            <a:ext cx="2649538" cy="3429000"/>
           </a:xfrm>
           <a:custGeom>
             <a:avLst/>
@@ -1197,8 +1202,8 @@
         </p:nvSpPr>
         <p:spPr>
           <a:xfrm>
-            <a:off x="2104459" y="685800"/>
-            <a:ext cx="2649600" cy="3429000"/>
+            <a:off x="2105025" y="685800"/>
+            <a:ext cx="2649538" cy="3429000"/>
           </a:xfrm>
           <a:custGeom>
             <a:avLst/>
@@ -1301,8 +1306,8 @@
         </p:nvSpPr>
         <p:spPr>
           <a:xfrm>
-            <a:off x="2104459" y="685800"/>
-            <a:ext cx="2649600" cy="3429000"/>
+            <a:off x="2105025" y="685800"/>
+            <a:ext cx="2649538" cy="3429000"/>
           </a:xfrm>
           <a:custGeom>
             <a:avLst/>
@@ -1617,8 +1622,8 @@
         </p:nvSpPr>
         <p:spPr>
           <a:xfrm>
-            <a:off x="2104480" y="685800"/>
-            <a:ext cx="2649600" cy="3429000"/>
+            <a:off x="2105025" y="685800"/>
+            <a:ext cx="2649538" cy="3429000"/>
           </a:xfrm>
           <a:custGeom>
             <a:avLst/>
@@ -1721,8 +1726,8 @@
         </p:nvSpPr>
         <p:spPr>
           <a:xfrm>
-            <a:off x="2104459" y="685800"/>
-            <a:ext cx="2649600" cy="3429000"/>
+            <a:off x="2105025" y="685800"/>
+            <a:ext cx="2649538" cy="3429000"/>
           </a:xfrm>
           <a:custGeom>
             <a:avLst/>
@@ -1825,8 +1830,8 @@
         </p:nvSpPr>
         <p:spPr>
           <a:xfrm>
-            <a:off x="2104459" y="685800"/>
-            <a:ext cx="2649600" cy="3429000"/>
+            <a:off x="2105025" y="685800"/>
+            <a:ext cx="2649538" cy="3429000"/>
           </a:xfrm>
           <a:custGeom>
             <a:avLst/>
@@ -2033,8 +2038,8 @@
         </p:nvSpPr>
         <p:spPr>
           <a:xfrm>
-            <a:off x="2104459" y="685800"/>
-            <a:ext cx="2649600" cy="3429000"/>
+            <a:off x="2105025" y="685800"/>
+            <a:ext cx="2649538" cy="3429000"/>
           </a:xfrm>
           <a:custGeom>
             <a:avLst/>
@@ -2137,8 +2142,8 @@
         </p:nvSpPr>
         <p:spPr>
           <a:xfrm>
-            <a:off x="2104459" y="685800"/>
-            <a:ext cx="2649600" cy="3429000"/>
+            <a:off x="2105025" y="685800"/>
+            <a:ext cx="2649538" cy="3429000"/>
           </a:xfrm>
           <a:custGeom>
             <a:avLst/>
@@ -2241,8 +2246,8 @@
         </p:nvSpPr>
         <p:spPr>
           <a:xfrm>
-            <a:off x="2104459" y="685800"/>
-            <a:ext cx="2649600" cy="3429000"/>
+            <a:off x="2105025" y="685800"/>
+            <a:ext cx="2649538" cy="3429000"/>
           </a:xfrm>
           <a:custGeom>
             <a:avLst/>
@@ -2345,8 +2350,8 @@
         </p:nvSpPr>
         <p:spPr>
           <a:xfrm>
-            <a:off x="2104459" y="685800"/>
-            <a:ext cx="2649600" cy="3429000"/>
+            <a:off x="2105025" y="685800"/>
+            <a:ext cx="2649538" cy="3429000"/>
           </a:xfrm>
           <a:custGeom>
             <a:avLst/>
@@ -2449,8 +2454,8 @@
         </p:nvSpPr>
         <p:spPr>
           <a:xfrm>
-            <a:off x="2104459" y="685800"/>
-            <a:ext cx="2649600" cy="3429000"/>
+            <a:off x="2105025" y="685800"/>
+            <a:ext cx="2649538" cy="3429000"/>
           </a:xfrm>
           <a:custGeom>
             <a:avLst/>
@@ -28667,7 +28672,7 @@
               <a:buChar char="●"/>
             </a:pPr>
             <a:r>
-              <a:rPr lang="en" sz="1900" b="1">
+              <a:rPr lang="en" sz="1900" b="1" dirty="0">
                 <a:latin typeface="Open Sans"/>
                 <a:ea typeface="Open Sans"/>
                 <a:cs typeface="Open Sans"/>
@@ -28675,7 +28680,7 @@
               </a:rPr>
               <a:t>Conceptual</a:t>
             </a:r>
-            <a:endParaRPr sz="1900" b="1">
+            <a:endParaRPr sz="1900" b="1" dirty="0">
               <a:latin typeface="Open Sans"/>
               <a:ea typeface="Open Sans"/>
               <a:cs typeface="Open Sans"/>
@@ -28696,7 +28701,7 @@
               <a:buNone/>
             </a:pPr>
             <a:r>
-              <a:rPr lang="en" sz="1200">
+              <a:rPr lang="en" sz="1200" dirty="0">
                 <a:solidFill>
                   <a:srgbClr val="525C65"/>
                 </a:solidFill>
@@ -28710,7 +28715,7 @@
               </a:rPr>
               <a:t>This is the most general level of data modeling. At the conceptual level, you should be thinking about creating entities that represent business objects for the database. Think broadly here. Attributes (or column names) are not required at this point, but relationship lines are required (although Crow's foot notation is not needed at this level). Create at least three entities for this model; thinking about the 3NF will aid you in deciding the type of entities to create.</a:t>
             </a:r>
-            <a:endParaRPr sz="1200">
+            <a:endParaRPr sz="1200" dirty="0">
               <a:solidFill>
                 <a:srgbClr val="525C65"/>
               </a:solidFill>
@@ -28737,7 +28742,7 @@
               <a:buNone/>
             </a:pPr>
             <a:r>
-              <a:rPr lang="en" sz="1200">
+              <a:rPr lang="en" sz="1200" dirty="0">
                 <a:solidFill>
                   <a:srgbClr val="525C65"/>
                 </a:solidFill>
@@ -28749,9 +28754,39 @@
                 <a:cs typeface="Open Sans"/>
                 <a:sym typeface="Open Sans"/>
               </a:rPr>
-              <a:t>Use Lucidchart’s built-in template for DBMS ER Diagram UML.</a:t>
+              <a:t>Use </a:t>
             </a:r>
-            <a:endParaRPr sz="1200">
+            <a:r>
+              <a:rPr lang="en" sz="1200" dirty="0" err="1">
+                <a:solidFill>
+                  <a:srgbClr val="525C65"/>
+                </a:solidFill>
+                <a:highlight>
+                  <a:srgbClr val="FFFFFF"/>
+                </a:highlight>
+                <a:latin typeface="Open Sans"/>
+                <a:ea typeface="Open Sans"/>
+                <a:cs typeface="Open Sans"/>
+                <a:sym typeface="Open Sans"/>
+              </a:rPr>
+              <a:t>Lucidchart’s</a:t>
+            </a:r>
+            <a:r>
+              <a:rPr lang="en" sz="1200" dirty="0">
+                <a:solidFill>
+                  <a:srgbClr val="525C65"/>
+                </a:solidFill>
+                <a:highlight>
+                  <a:srgbClr val="FFFFFF"/>
+                </a:highlight>
+                <a:latin typeface="Open Sans"/>
+                <a:ea typeface="Open Sans"/>
+                <a:cs typeface="Open Sans"/>
+                <a:sym typeface="Open Sans"/>
+              </a:rPr>
+              <a:t> built-in template for DBMS ER Diagram UML.</a:t>
+            </a:r>
+            <a:endParaRPr sz="1200" dirty="0">
               <a:solidFill>
                 <a:srgbClr val="525C65"/>
               </a:solidFill>
@@ -28777,7 +28812,7 @@
               </a:spcAft>
               <a:buNone/>
             </a:pPr>
-            <a:endParaRPr sz="1200">
+            <a:endParaRPr sz="1200" dirty="0">
               <a:solidFill>
                 <a:srgbClr val="525C65"/>
               </a:solidFill>
@@ -28803,48 +28838,7 @@
               </a:spcAft>
               <a:buNone/>
             </a:pPr>
-            <a:r>
-              <a:rPr lang="en" sz="1200">
-                <a:solidFill>
-                  <a:srgbClr val="FF0000"/>
-                </a:solidFill>
-                <a:highlight>
-                  <a:srgbClr val="FFFFFF"/>
-                </a:highlight>
-                <a:latin typeface="Open Sans"/>
-                <a:ea typeface="Open Sans"/>
-                <a:cs typeface="Open Sans"/>
-                <a:sym typeface="Open Sans"/>
-              </a:rPr>
-              <a:t>** Replace example screenshot below with your response</a:t>
-            </a:r>
-            <a:endParaRPr sz="1200">
-              <a:solidFill>
-                <a:srgbClr val="FF0000"/>
-              </a:solidFill>
-              <a:highlight>
-                <a:srgbClr val="FFFFFF"/>
-              </a:highlight>
-              <a:latin typeface="Open Sans"/>
-              <a:ea typeface="Open Sans"/>
-              <a:cs typeface="Open Sans"/>
-              <a:sym typeface="Open Sans"/>
-            </a:endParaRPr>
-          </a:p>
-          <a:p>
-            <a:pPr marL="0" lvl="0" indent="0" algn="l" rtl="0">
-              <a:lnSpc>
-                <a:spcPct val="170000"/>
-              </a:lnSpc>
-              <a:spcBef>
-                <a:spcPts val="0"/>
-              </a:spcBef>
-              <a:spcAft>
-                <a:spcPts val="0"/>
-              </a:spcAft>
-              <a:buNone/>
-            </a:pPr>
-            <a:endParaRPr sz="1200">
+            <a:endParaRPr sz="1200" dirty="0">
               <a:solidFill>
                 <a:srgbClr val="525C65"/>
               </a:solidFill>
@@ -28872,42 +28866,38 @@
               <a:buFont typeface="Arial"/>
               <a:buNone/>
             </a:pPr>
-            <a:endParaRPr sz="1900"/>
+            <a:endParaRPr sz="1900" dirty="0"/>
           </a:p>
         </p:txBody>
       </p:sp>
       <p:pic>
         <p:nvPicPr>
-          <p:cNvPr id="250" name="Google Shape;250;p62"/>
-          <p:cNvPicPr preferRelativeResize="0"/>
+          <p:cNvPr id="3" name="Picture 2" descr="Diagram&#10;&#10;Description automatically generated">
+            <a:extLst>
+              <a:ext uri="{FF2B5EF4-FFF2-40B4-BE49-F238E27FC236}">
+                <a16:creationId xmlns:a16="http://schemas.microsoft.com/office/drawing/2014/main" id="{CA470CD7-0D02-DC4D-901C-F7BF0E2B114E}"/>
+              </a:ext>
+            </a:extLst>
+          </p:cNvPr>
+          <p:cNvPicPr>
+            <a:picLocks noChangeAspect="1"/>
+          </p:cNvPicPr>
           <p:nvPr/>
         </p:nvPicPr>
         <p:blipFill>
-          <a:blip r:embed="rId3">
-            <a:alphaModFix/>
-          </a:blip>
+          <a:blip r:embed="rId3"/>
           <a:stretch>
             <a:fillRect/>
           </a:stretch>
         </p:blipFill>
         <p:spPr>
           <a:xfrm>
-            <a:off x="755850" y="5786403"/>
-            <a:ext cx="6085425" cy="2570274"/>
+            <a:off x="541867" y="5587999"/>
+            <a:ext cx="6856566" cy="2091189"/>
           </a:xfrm>
           <a:prstGeom prst="rect">
             <a:avLst/>
           </a:prstGeom>
-          <a:noFill/>
-          <a:ln w="9525" cap="flat" cmpd="sng">
-            <a:solidFill>
-              <a:schemeClr val="dk2"/>
-            </a:solidFill>
-            <a:prstDash val="solid"/>
-            <a:round/>
-            <a:headEnd type="none" w="sm" len="sm"/>
-            <a:tailEnd type="none" w="sm" len="sm"/>
-          </a:ln>
         </p:spPr>
       </p:pic>
     </p:spTree>
@@ -29014,7 +29004,7 @@
               <a:buChar char="●"/>
             </a:pPr>
             <a:r>
-              <a:rPr lang="en" sz="1900" b="1">
+              <a:rPr lang="en" sz="1900" b="1" dirty="0">
                 <a:latin typeface="Open Sans"/>
                 <a:ea typeface="Open Sans"/>
                 <a:cs typeface="Open Sans"/>
@@ -29022,7 +29012,7 @@
               </a:rPr>
               <a:t>Logical</a:t>
             </a:r>
-            <a:endParaRPr sz="1900" b="1">
+            <a:endParaRPr sz="1900" b="1" dirty="0">
               <a:latin typeface="Open Sans"/>
               <a:ea typeface="Open Sans"/>
               <a:cs typeface="Open Sans"/>
@@ -29043,7 +29033,7 @@
               <a:buNone/>
             </a:pPr>
             <a:r>
-              <a:rPr lang="en" sz="1400">
+              <a:rPr lang="en" sz="1400" dirty="0">
                 <a:solidFill>
                   <a:srgbClr val="525C65"/>
                 </a:solidFill>
@@ -29057,7 +29047,7 @@
               </a:rPr>
               <a:t>The logical model is the next level of refinement from the conceptual ERD. At this point, you should have normalized the data to the 3NF. Attributes should also be listed now in the ERD. You can still use human-friendly entity and attribute names in the logical model, and while relationship lines are required, Crow's foot notation is still not needed at this point.</a:t>
             </a:r>
-            <a:endParaRPr sz="1400">
+            <a:endParaRPr sz="1400" dirty="0">
               <a:solidFill>
                 <a:srgbClr val="525C65"/>
               </a:solidFill>
@@ -29084,7 +29074,7 @@
               <a:buNone/>
             </a:pPr>
             <a:r>
-              <a:rPr lang="en" sz="1400">
+              <a:rPr lang="en" sz="1400" dirty="0">
                 <a:solidFill>
                   <a:srgbClr val="525C65"/>
                 </a:solidFill>
@@ -29096,9 +29086,39 @@
                 <a:cs typeface="Open Sans"/>
                 <a:sym typeface="Open Sans"/>
               </a:rPr>
-              <a:t>Use Lucidchart’s built-in template for DBMS ER Diagram UML.</a:t>
+              <a:t>Use </a:t>
             </a:r>
-            <a:endParaRPr sz="1400">
+            <a:r>
+              <a:rPr lang="en" sz="1400" dirty="0" err="1">
+                <a:solidFill>
+                  <a:srgbClr val="525C65"/>
+                </a:solidFill>
+                <a:highlight>
+                  <a:srgbClr val="FFFFFF"/>
+                </a:highlight>
+                <a:latin typeface="Open Sans"/>
+                <a:ea typeface="Open Sans"/>
+                <a:cs typeface="Open Sans"/>
+                <a:sym typeface="Open Sans"/>
+              </a:rPr>
+              <a:t>Lucidchart’s</a:t>
+            </a:r>
+            <a:r>
+              <a:rPr lang="en" sz="1400" dirty="0">
+                <a:solidFill>
+                  <a:srgbClr val="525C65"/>
+                </a:solidFill>
+                <a:highlight>
+                  <a:srgbClr val="FFFFFF"/>
+                </a:highlight>
+                <a:latin typeface="Open Sans"/>
+                <a:ea typeface="Open Sans"/>
+                <a:cs typeface="Open Sans"/>
+                <a:sym typeface="Open Sans"/>
+              </a:rPr>
+              <a:t> built-in template for DBMS ER Diagram UML.</a:t>
+            </a:r>
+            <a:endParaRPr sz="1400" dirty="0">
               <a:solidFill>
                 <a:srgbClr val="525C65"/>
               </a:solidFill>
@@ -29129,7 +29149,7 @@
               <a:buFont typeface="Arial"/>
               <a:buNone/>
             </a:pPr>
-            <a:endParaRPr sz="1200">
+            <a:endParaRPr sz="1200" dirty="0">
               <a:solidFill>
                 <a:srgbClr val="525C65"/>
               </a:solidFill>
@@ -29143,62 +29163,40 @@
             </a:endParaRPr>
           </a:p>
           <a:p>
+            <a:pPr marL="457200" lvl="0" indent="0" algn="l" rtl="0">
+              <a:spcBef>
+                <a:spcPts val="0"/>
+              </a:spcBef>
+              <a:spcAft>
+                <a:spcPts val="0"/>
+              </a:spcAft>
+              <a:buNone/>
+            </a:pPr>
+            <a:endParaRPr sz="1900" dirty="0"/>
+          </a:p>
+          <a:p>
             <a:pPr marL="0" lvl="0" indent="0" algn="l" rtl="0">
-              <a:lnSpc>
-                <a:spcPct val="170000"/>
-              </a:lnSpc>
-              <a:spcBef>
-                <a:spcPts val="0"/>
-              </a:spcBef>
-              <a:spcAft>
-                <a:spcPts val="0"/>
-              </a:spcAft>
-              <a:buClr>
-                <a:schemeClr val="dk1"/>
-              </a:buClr>
-              <a:buSzPts val="1100"/>
-              <a:buFont typeface="Arial"/>
+              <a:spcBef>
+                <a:spcPts val="1600"/>
+              </a:spcBef>
+              <a:spcAft>
+                <a:spcPts val="0"/>
+              </a:spcAft>
               <a:buNone/>
             </a:pPr>
-            <a:r>
-              <a:rPr lang="en" sz="1200">
-                <a:solidFill>
-                  <a:srgbClr val="FF0000"/>
-                </a:solidFill>
-                <a:highlight>
-                  <a:schemeClr val="lt1"/>
-                </a:highlight>
-                <a:latin typeface="Open Sans"/>
-                <a:ea typeface="Open Sans"/>
-                <a:cs typeface="Open Sans"/>
-                <a:sym typeface="Open Sans"/>
-              </a:rPr>
-              <a:t>** Replace example screenshot below with your response</a:t>
-            </a:r>
-            <a:endParaRPr sz="1400">
-              <a:solidFill>
-                <a:srgbClr val="525C65"/>
-              </a:solidFill>
-              <a:highlight>
-                <a:srgbClr val="FFFFFF"/>
-              </a:highlight>
-              <a:latin typeface="Open Sans"/>
-              <a:ea typeface="Open Sans"/>
-              <a:cs typeface="Open Sans"/>
-              <a:sym typeface="Open Sans"/>
-            </a:endParaRPr>
-          </a:p>
-          <a:p>
-            <a:pPr marL="457200" lvl="0" indent="0" algn="l" rtl="0">
-              <a:spcBef>
-                <a:spcPts val="0"/>
+            <a:endParaRPr sz="1900" dirty="0"/>
+          </a:p>
+          <a:p>
+            <a:pPr marL="0" lvl="0" indent="0" algn="l" rtl="0">
+              <a:spcBef>
+                <a:spcPts val="1600"/>
               </a:spcBef>
               <a:spcAft>
                 <a:spcPts val="0"/>
               </a:spcAft>
               <a:buNone/>
             </a:pPr>
-            <a:endParaRPr sz="1900"/>
+            <a:endParaRPr sz="1900" dirty="0"/>
           </a:p>
           <a:p>
             <a:pPr marL="0" lvl="0" indent="0" algn="l" rtl="0">
@@ -29210,7 +29208,7 @@
               </a:spcAft>
               <a:buNone/>
             </a:pPr>
-            <a:endParaRPr sz="1900"/>
+            <a:endParaRPr sz="1900" dirty="0"/>
           </a:p>
           <a:p>
             <a:pPr marL="0" lvl="0" indent="0" algn="l" rtl="0">
@@ -29218,70 +29216,42 @@
                 <a:spcPts val="1600"/>
               </a:spcBef>
               <a:spcAft>
-                <a:spcPts val="0"/>
+                <a:spcPts val="1600"/>
               </a:spcAft>
               <a:buNone/>
             </a:pPr>
-            <a:endParaRPr sz="1900"/>
-          </a:p>
-          <a:p>
-            <a:pPr marL="0" lvl="0" indent="0" algn="l" rtl="0">
-              <a:spcBef>
-                <a:spcPts val="1600"/>
-              </a:spcBef>
-              <a:spcAft>
-                <a:spcPts val="0"/>
-              </a:spcAft>
-              <a:buNone/>
-            </a:pPr>
-            <a:endParaRPr sz="1900"/>
-          </a:p>
-          <a:p>
-            <a:pPr marL="0" lvl="0" indent="0" algn="l" rtl="0">
-              <a:spcBef>
-                <a:spcPts val="1600"/>
-              </a:spcBef>
-              <a:spcAft>
-                <a:spcPts val="1600"/>
-              </a:spcAft>
-              <a:buNone/>
-            </a:pPr>
-            <a:endParaRPr sz="1900"/>
+            <a:endParaRPr sz="1900" dirty="0"/>
           </a:p>
         </p:txBody>
       </p:sp>
       <p:pic>
         <p:nvPicPr>
-          <p:cNvPr id="257" name="Google Shape;257;p63"/>
-          <p:cNvPicPr preferRelativeResize="0"/>
+          <p:cNvPr id="3" name="Picture 2" descr="Diagram&#10;&#10;Description automatically generated">
+            <a:extLst>
+              <a:ext uri="{FF2B5EF4-FFF2-40B4-BE49-F238E27FC236}">
+                <a16:creationId xmlns:a16="http://schemas.microsoft.com/office/drawing/2014/main" id="{D8836254-AB93-084A-A193-A7EE4FB97134}"/>
+              </a:ext>
+            </a:extLst>
+          </p:cNvPr>
+          <p:cNvPicPr>
+            <a:picLocks noChangeAspect="1"/>
+          </p:cNvPicPr>
           <p:nvPr/>
         </p:nvPicPr>
         <p:blipFill>
-          <a:blip r:embed="rId3">
-            <a:alphaModFix/>
-          </a:blip>
+          <a:blip r:embed="rId3"/>
           <a:stretch>
             <a:fillRect/>
           </a:stretch>
         </p:blipFill>
         <p:spPr>
           <a:xfrm>
-            <a:off x="484950" y="5969175"/>
-            <a:ext cx="6802502" cy="3038826"/>
+            <a:off x="373914" y="5602834"/>
+            <a:ext cx="7133536" cy="3515766"/>
           </a:xfrm>
           <a:prstGeom prst="rect">
             <a:avLst/>
           </a:prstGeom>
-          <a:noFill/>
-          <a:ln w="9525" cap="flat" cmpd="sng">
-            <a:solidFill>
-              <a:schemeClr val="dk2"/>
-            </a:solidFill>
-            <a:prstDash val="solid"/>
-            <a:round/>
-            <a:headEnd type="none" w="sm" len="sm"/>
-            <a:tailEnd type="none" w="sm" len="sm"/>
-          </a:ln>
         </p:spPr>
       </p:pic>
     </p:spTree>
@@ -29388,7 +29358,7 @@
               <a:buChar char="●"/>
             </a:pPr>
             <a:r>
-              <a:rPr lang="en" sz="1900" b="1">
+              <a:rPr lang="en" sz="1900" b="1" dirty="0">
                 <a:latin typeface="Open Sans"/>
                 <a:ea typeface="Open Sans"/>
                 <a:cs typeface="Open Sans"/>
@@ -29396,7 +29366,7 @@
               </a:rPr>
               <a:t>Physical</a:t>
             </a:r>
-            <a:endParaRPr sz="1900" b="1">
+            <a:endParaRPr sz="1900" b="1" dirty="0">
               <a:latin typeface="Open Sans"/>
               <a:ea typeface="Open Sans"/>
               <a:cs typeface="Open Sans"/>
@@ -29417,7 +29387,7 @@
               <a:buNone/>
             </a:pPr>
             <a:r>
-              <a:rPr lang="en" sz="1400">
+              <a:rPr lang="en" sz="1400" dirty="0">
                 <a:solidFill>
                   <a:srgbClr val="525C65"/>
                 </a:solidFill>
@@ -29431,7 +29401,7 @@
               </a:rPr>
               <a:t>The physical model is what will be built in the database. Each entity should represent a database table, complete with column names and data types. Primary keys and foreign keys should also be represented here. Primary keys should be in bold type with the (PK) designation following the field name. Foreign keys should be in normal type face, but have the designation (FK) after the column name. Finally, in the physical model, Crow's foot notation is important.</a:t>
             </a:r>
-            <a:endParaRPr sz="1200">
+            <a:endParaRPr sz="1200" dirty="0">
               <a:solidFill>
                 <a:srgbClr val="525C65"/>
               </a:solidFill>
@@ -29445,39 +29415,16 @@
             </a:endParaRPr>
           </a:p>
           <a:p>
-            <a:pPr marL="0" lvl="0" indent="0" algn="l" rtl="0">
-              <a:lnSpc>
-                <a:spcPct val="170000"/>
-              </a:lnSpc>
-              <a:spcBef>
+            <a:pPr marL="457200" lvl="0" indent="0" algn="l" rtl="0">
+              <a:spcBef>
+                <a:spcPts val="0"/>
+              </a:spcBef>
+              <a:spcAft>
                 <a:spcPts val="1600"/>
-              </a:spcBef>
-              <a:spcAft>
-                <a:spcPts val="0"/>
-              </a:spcAft>
-              <a:buClr>
-                <a:schemeClr val="dk1"/>
-              </a:buClr>
-              <a:buSzPts val="1100"/>
-              <a:buFont typeface="Arial"/>
+              </a:spcAft>
               <a:buNone/>
             </a:pPr>
-            <a:r>
-              <a:rPr lang="en" sz="1200">
-                <a:solidFill>
-                  <a:srgbClr val="FF0000"/>
-                </a:solidFill>
-                <a:highlight>
-                  <a:schemeClr val="lt1"/>
-                </a:highlight>
-                <a:latin typeface="Open Sans"/>
-                <a:ea typeface="Open Sans"/>
-                <a:cs typeface="Open Sans"/>
-                <a:sym typeface="Open Sans"/>
-              </a:rPr>
-              <a:t>** Replace example screenshot below with your response</a:t>
-            </a:r>
-            <a:endParaRPr sz="1500">
+            <a:endParaRPr sz="1500" dirty="0">
               <a:solidFill>
                 <a:srgbClr val="525C65"/>
               </a:solidFill>
@@ -29490,63 +29437,36 @@
               <a:sym typeface="Open Sans"/>
             </a:endParaRPr>
           </a:p>
-          <a:p>
-            <a:pPr marL="457200" lvl="0" indent="0" algn="l" rtl="0">
-              <a:spcBef>
-                <a:spcPts val="0"/>
-              </a:spcBef>
-              <a:spcAft>
-                <a:spcPts val="1600"/>
-              </a:spcAft>
-              <a:buNone/>
-            </a:pPr>
-            <a:endParaRPr sz="1500">
-              <a:solidFill>
-                <a:srgbClr val="525C65"/>
-              </a:solidFill>
-              <a:highlight>
-                <a:srgbClr val="FFFFFF"/>
-              </a:highlight>
-              <a:latin typeface="Open Sans"/>
-              <a:ea typeface="Open Sans"/>
-              <a:cs typeface="Open Sans"/>
-              <a:sym typeface="Open Sans"/>
-            </a:endParaRPr>
-          </a:p>
         </p:txBody>
       </p:sp>
       <p:pic>
         <p:nvPicPr>
-          <p:cNvPr id="264" name="Google Shape;264;p64"/>
-          <p:cNvPicPr preferRelativeResize="0"/>
+          <p:cNvPr id="3" name="Picture 2" descr="Graphical user interface&#10;&#10;Description automatically generated">
+            <a:extLst>
+              <a:ext uri="{FF2B5EF4-FFF2-40B4-BE49-F238E27FC236}">
+                <a16:creationId xmlns:a16="http://schemas.microsoft.com/office/drawing/2014/main" id="{1153D9EE-2A91-0047-9A55-3A3F8C00C1FC}"/>
+              </a:ext>
+            </a:extLst>
+          </p:cNvPr>
+          <p:cNvPicPr>
+            <a:picLocks noChangeAspect="1"/>
+          </p:cNvPicPr>
           <p:nvPr/>
         </p:nvPicPr>
         <p:blipFill>
-          <a:blip r:embed="rId3">
-            <a:alphaModFix/>
-          </a:blip>
+          <a:blip r:embed="rId3"/>
           <a:stretch>
             <a:fillRect/>
           </a:stretch>
         </p:blipFill>
         <p:spPr>
           <a:xfrm>
-            <a:off x="832174" y="5859975"/>
-            <a:ext cx="6108049" cy="3630424"/>
+            <a:off x="264850" y="5691825"/>
+            <a:ext cx="7242600" cy="2495896"/>
           </a:xfrm>
           <a:prstGeom prst="rect">
             <a:avLst/>
           </a:prstGeom>
-          <a:noFill/>
-          <a:ln w="9525" cap="flat" cmpd="sng">
-            <a:solidFill>
-              <a:schemeClr val="dk2"/>
-            </a:solidFill>
-            <a:prstDash val="solid"/>
-            <a:round/>
-            <a:headEnd type="none" w="sm" len="sm"/>
-            <a:tailEnd type="none" w="sm" len="sm"/>
-          </a:ln>
         </p:spPr>
       </p:pic>
     </p:spTree>
@@ -30720,10 +30640,10 @@
               <a:buNone/>
             </a:pPr>
             <a:r>
-              <a:rPr lang="en" sz="1900"/>
+              <a:rPr lang="en" sz="1900" dirty="0"/>
               <a:t>Create a DDL SQL script capable of building the database you designed in Step 2</a:t>
             </a:r>
-            <a:endParaRPr sz="1900"/>
+            <a:endParaRPr sz="1900" dirty="0"/>
           </a:p>
           <a:p>
             <a:pPr marL="241300" marR="241300" lvl="0" indent="0" algn="l" rtl="0">
@@ -30744,7 +30664,7 @@
               <a:buNone/>
             </a:pPr>
             <a:r>
-              <a:rPr lang="en" sz="1350" b="1">
+              <a:rPr lang="en" sz="1350" b="1" dirty="0">
                 <a:solidFill>
                   <a:srgbClr val="2E3D49"/>
                 </a:solidFill>
@@ -30758,7 +30678,7 @@
               </a:rPr>
               <a:t>Hints</a:t>
             </a:r>
-            <a:endParaRPr sz="1350" b="1">
+            <a:endParaRPr sz="1350" b="1" dirty="0">
               <a:solidFill>
                 <a:srgbClr val="2E3D49"/>
               </a:solidFill>
@@ -30790,7 +30710,7 @@
               <a:buNone/>
             </a:pPr>
             <a:r>
-              <a:rPr lang="en" sz="1350">
+              <a:rPr lang="en" sz="1350" dirty="0">
                 <a:solidFill>
                   <a:srgbClr val="525C65"/>
                 </a:solidFill>
@@ -30804,7 +30724,7 @@
               </a:rPr>
               <a:t>The DDL script will be graded by running the code you submit. Please ensure your SQL code runs properly.</a:t>
             </a:r>
-            <a:endParaRPr sz="1350">
+            <a:endParaRPr sz="1350" dirty="0">
               <a:solidFill>
                 <a:srgbClr val="525C65"/>
               </a:solidFill>
@@ -30835,7 +30755,7 @@
               <a:buFont typeface="Arial"/>
               <a:buNone/>
             </a:pPr>
-            <a:endParaRPr sz="1350">
+            <a:endParaRPr sz="1350" dirty="0">
               <a:solidFill>
                 <a:srgbClr val="525C65"/>
               </a:solidFill>
@@ -30862,7 +30782,7 @@
               <a:buNone/>
             </a:pPr>
             <a:r>
-              <a:rPr lang="en" sz="1350">
+              <a:rPr lang="en" sz="1350" dirty="0">
                 <a:solidFill>
                   <a:srgbClr val="525C65"/>
                 </a:solidFill>
@@ -30876,7 +30796,7 @@
               </a:rPr>
               <a:t>Foreign keys cannot be created on tables that do not exist yet, so it may be easier to create all tables in the database, then to go back and run modify statements on the tables to create foreign key constraints.</a:t>
             </a:r>
-            <a:endParaRPr sz="1350">
+            <a:endParaRPr sz="1350" dirty="0">
               <a:solidFill>
                 <a:srgbClr val="525C65"/>
               </a:solidFill>
@@ -30902,7 +30822,7 @@
               </a:spcAft>
               <a:buNone/>
             </a:pPr>
-            <a:endParaRPr sz="1350">
+            <a:endParaRPr sz="1350" dirty="0">
               <a:solidFill>
                 <a:srgbClr val="2E3D49"/>
               </a:solidFill>
@@ -30916,62 +30836,28 @@
             </a:endParaRPr>
           </a:p>
           <a:p>
-            <a:pPr marL="241300" marR="241300" lvl="0" indent="0" algn="l" rtl="0">
-              <a:lnSpc>
-                <a:spcPct val="100000"/>
-              </a:lnSpc>
-              <a:spcBef>
-                <a:spcPts val="0"/>
-              </a:spcBef>
-              <a:spcAft>
-                <a:spcPts val="0"/>
-              </a:spcAft>
-              <a:buClr>
-                <a:schemeClr val="dk1"/>
-              </a:buClr>
-              <a:buSzPts val="1100"/>
-              <a:buFont typeface="Arial"/>
+            <a:pPr marL="457200" lvl="0" indent="0" algn="l" rtl="0">
+              <a:spcBef>
+                <a:spcPts val="0"/>
+              </a:spcBef>
+              <a:spcAft>
+                <a:spcPts val="0"/>
+              </a:spcAft>
               <a:buNone/>
             </a:pPr>
-            <a:r>
-              <a:rPr lang="en" sz="1350">
-                <a:solidFill>
-                  <a:srgbClr val="FF0000"/>
-                </a:solidFill>
-                <a:highlight>
-                  <a:srgbClr val="FFFFFF"/>
-                </a:highlight>
-                <a:latin typeface="Open Sans"/>
-                <a:ea typeface="Open Sans"/>
-                <a:cs typeface="Open Sans"/>
-                <a:sym typeface="Open Sans"/>
-              </a:rPr>
-              <a:t>Remember to submit the related SQL file as well, not just a screenshot (replace the below screenshot).</a:t>
-            </a:r>
-            <a:endParaRPr sz="1350">
-              <a:solidFill>
-                <a:srgbClr val="FF0000"/>
-              </a:solidFill>
-              <a:highlight>
-                <a:srgbClr val="FFFFFF"/>
-              </a:highlight>
-              <a:latin typeface="Open Sans"/>
-              <a:ea typeface="Open Sans"/>
-              <a:cs typeface="Open Sans"/>
-              <a:sym typeface="Open Sans"/>
-            </a:endParaRPr>
+            <a:endParaRPr sz="1900" dirty="0"/>
           </a:p>
           <a:p>
             <a:pPr marL="457200" lvl="0" indent="0" algn="l" rtl="0">
               <a:spcBef>
-                <a:spcPts val="0"/>
+                <a:spcPts val="1600"/>
               </a:spcBef>
               <a:spcAft>
                 <a:spcPts val="0"/>
               </a:spcAft>
               <a:buNone/>
             </a:pPr>
-            <a:endParaRPr sz="1900"/>
+            <a:endParaRPr sz="1900" dirty="0"/>
           </a:p>
           <a:p>
             <a:pPr marL="457200" lvl="0" indent="0" algn="l" rtl="0">
@@ -30983,7 +30869,7 @@
               </a:spcAft>
               <a:buNone/>
             </a:pPr>
-            <a:endParaRPr sz="1900"/>
+            <a:endParaRPr sz="1900" dirty="0"/>
           </a:p>
           <a:p>
             <a:pPr marL="457200" lvl="0" indent="0" algn="l" rtl="0">
@@ -30991,57 +30877,42 @@
                 <a:spcPts val="1600"/>
               </a:spcBef>
               <a:spcAft>
-                <a:spcPts val="0"/>
+                <a:spcPts val="1600"/>
               </a:spcAft>
               <a:buNone/>
             </a:pPr>
-            <a:endParaRPr sz="1900"/>
-          </a:p>
-          <a:p>
-            <a:pPr marL="457200" lvl="0" indent="0" algn="l" rtl="0">
-              <a:spcBef>
-                <a:spcPts val="1600"/>
-              </a:spcBef>
-              <a:spcAft>
-                <a:spcPts val="1600"/>
-              </a:spcAft>
-              <a:buNone/>
-            </a:pPr>
-            <a:endParaRPr sz="1900"/>
+            <a:endParaRPr sz="1900" dirty="0"/>
           </a:p>
         </p:txBody>
       </p:sp>
       <p:pic>
         <p:nvPicPr>
-          <p:cNvPr id="283" name="Google Shape;283;p67"/>
-          <p:cNvPicPr preferRelativeResize="0"/>
+          <p:cNvPr id="3" name="Picture 2" descr="Text&#10;&#10;Description automatically generated">
+            <a:extLst>
+              <a:ext uri="{FF2B5EF4-FFF2-40B4-BE49-F238E27FC236}">
+                <a16:creationId xmlns:a16="http://schemas.microsoft.com/office/drawing/2014/main" id="{E63EE616-7322-CB4A-8011-83460FF3C62F}"/>
+              </a:ext>
+            </a:extLst>
+          </p:cNvPr>
+          <p:cNvPicPr>
+            <a:picLocks noChangeAspect="1"/>
+          </p:cNvPicPr>
           <p:nvPr/>
         </p:nvPicPr>
-        <p:blipFill rotWithShape="1">
-          <a:blip r:embed="rId3">
-            <a:alphaModFix/>
-          </a:blip>
-          <a:srcRect l="2818" t="2391"/>
-          <a:stretch/>
+        <p:blipFill>
+          <a:blip r:embed="rId3"/>
+          <a:stretch>
+            <a:fillRect/>
+          </a:stretch>
         </p:blipFill>
         <p:spPr>
           <a:xfrm>
-            <a:off x="1641775" y="5527975"/>
-            <a:ext cx="3823475" cy="3971125"/>
+            <a:off x="2455334" y="4868333"/>
+            <a:ext cx="2230159" cy="5029200"/>
           </a:xfrm>
           <a:prstGeom prst="rect">
             <a:avLst/>
           </a:prstGeom>
-          <a:noFill/>
-          <a:ln w="9525" cap="flat" cmpd="sng">
-            <a:solidFill>
-              <a:schemeClr val="dk2"/>
-            </a:solidFill>
-            <a:prstDash val="solid"/>
-            <a:round/>
-            <a:headEnd type="none" w="sm" len="sm"/>
-            <a:tailEnd type="none" w="sm" len="sm"/>
-          </a:ln>
         </p:spPr>
       </p:pic>
     </p:spTree>
@@ -31145,7 +31016,7 @@
               </a:spcAft>
               <a:buNone/>
             </a:pPr>
-            <a:endParaRPr sz="1900"/>
+            <a:endParaRPr sz="1900" dirty="0"/>
           </a:p>
           <a:p>
             <a:pPr marL="457200" lvl="0" indent="-349250" algn="l" rtl="0">
@@ -31160,7 +31031,7 @@
               <a:buChar char="●"/>
             </a:pPr>
             <a:r>
-              <a:rPr lang="en" sz="1900" b="1">
+              <a:rPr lang="en" sz="1900" b="1" dirty="0">
                 <a:latin typeface="Open Sans"/>
                 <a:ea typeface="Open Sans"/>
                 <a:cs typeface="Open Sans"/>
@@ -31168,7 +31039,7 @@
               </a:rPr>
               <a:t>Question 1: Return a list of employees with Job Titles and Department Names</a:t>
             </a:r>
-            <a:endParaRPr sz="1900" b="1">
+            <a:endParaRPr sz="1900" b="1" dirty="0">
               <a:latin typeface="Open Sans"/>
               <a:ea typeface="Open Sans"/>
               <a:cs typeface="Open Sans"/>
@@ -31185,7 +31056,7 @@
               </a:spcAft>
               <a:buNone/>
             </a:pPr>
-            <a:endParaRPr sz="1900" b="1">
+            <a:endParaRPr sz="1900" b="1" dirty="0">
               <a:latin typeface="Open Sans"/>
               <a:ea typeface="Open Sans"/>
               <a:cs typeface="Open Sans"/>
@@ -31211,7 +31082,7 @@
               <a:buNone/>
             </a:pPr>
             <a:r>
-              <a:rPr lang="en" sz="1200">
+              <a:rPr lang="en" sz="1200" dirty="0">
                 <a:solidFill>
                   <a:srgbClr val="525C65"/>
                 </a:solidFill>
@@ -31225,22 +31096,7 @@
               </a:rPr>
               <a:t>     </a:t>
             </a:r>
-            <a:r>
-              <a:rPr lang="en" sz="1200">
-                <a:solidFill>
-                  <a:srgbClr val="FF0000"/>
-                </a:solidFill>
-                <a:highlight>
-                  <a:schemeClr val="lt1"/>
-                </a:highlight>
-                <a:latin typeface="Open Sans"/>
-                <a:ea typeface="Open Sans"/>
-                <a:cs typeface="Open Sans"/>
-                <a:sym typeface="Open Sans"/>
-              </a:rPr>
-              <a:t>** Replace example screenshot below with your response, and include the query in a SQL file</a:t>
-            </a:r>
-            <a:endParaRPr sz="1900" b="1">
+            <a:endParaRPr sz="1900" b="1" dirty="0">
               <a:latin typeface="Open Sans"/>
               <a:ea typeface="Open Sans"/>
               <a:cs typeface="Open Sans"/>
@@ -31250,14 +31106,14 @@
           <a:p>
             <a:pPr marL="0" lvl="0" indent="0" algn="l" rtl="0">
               <a:spcBef>
-                <a:spcPts val="0"/>
+                <a:spcPts val="1600"/>
               </a:spcBef>
               <a:spcAft>
                 <a:spcPts val="0"/>
               </a:spcAft>
               <a:buNone/>
             </a:pPr>
-            <a:endParaRPr sz="1900" b="1">
+            <a:endParaRPr sz="1900" b="1" dirty="0">
               <a:latin typeface="Open Sans"/>
               <a:ea typeface="Open Sans"/>
               <a:cs typeface="Open Sans"/>
@@ -31265,7 +31121,7 @@
             </a:endParaRPr>
           </a:p>
           <a:p>
-            <a:pPr marL="0" lvl="0" indent="0" algn="l" rtl="0">
+            <a:pPr marL="457200" lvl="0" indent="0" algn="l" rtl="0">
               <a:spcBef>
                 <a:spcPts val="1600"/>
               </a:spcBef>
@@ -31274,7 +31130,7 @@
               </a:spcAft>
               <a:buNone/>
             </a:pPr>
-            <a:endParaRPr sz="1900" b="1">
+            <a:endParaRPr sz="1900" b="1" dirty="0">
               <a:latin typeface="Open Sans"/>
               <a:ea typeface="Open Sans"/>
               <a:cs typeface="Open Sans"/>
@@ -31282,7 +31138,7 @@
             </a:endParaRPr>
           </a:p>
           <a:p>
-            <a:pPr marL="457200" lvl="0" indent="0" algn="l" rtl="0">
+            <a:pPr marL="0" lvl="0" indent="0" algn="l" rtl="0">
               <a:spcBef>
                 <a:spcPts val="1600"/>
               </a:spcBef>
@@ -31291,7 +31147,7 @@
               </a:spcAft>
               <a:buNone/>
             </a:pPr>
-            <a:endParaRPr sz="1900" b="1">
+            <a:endParaRPr sz="1900" b="1" dirty="0">
               <a:latin typeface="Open Sans"/>
               <a:ea typeface="Open Sans"/>
               <a:cs typeface="Open Sans"/>
@@ -31308,7 +31164,7 @@
               </a:spcAft>
               <a:buNone/>
             </a:pPr>
-            <a:endParaRPr sz="1900" b="1">
+            <a:endParaRPr sz="1900" b="1" dirty="0">
               <a:latin typeface="Open Sans"/>
               <a:ea typeface="Open Sans"/>
               <a:cs typeface="Open Sans"/>
@@ -31325,15 +31181,10 @@
               </a:spcAft>
               <a:buNone/>
             </a:pPr>
-            <a:endParaRPr sz="1900" b="1">
-              <a:latin typeface="Open Sans"/>
-              <a:ea typeface="Open Sans"/>
-              <a:cs typeface="Open Sans"/>
-              <a:sym typeface="Open Sans"/>
-            </a:endParaRPr>
-          </a:p>
-          <a:p>
-            <a:pPr marL="0" lvl="0" indent="0" algn="l" rtl="0">
+            <a:endParaRPr sz="1900" dirty="0"/>
+          </a:p>
+          <a:p>
+            <a:pPr marL="457200" lvl="0" indent="0" algn="l" rtl="0">
               <a:spcBef>
                 <a:spcPts val="1600"/>
               </a:spcBef>
@@ -31342,7 +31193,7 @@
               </a:spcAft>
               <a:buNone/>
             </a:pPr>
-            <a:endParaRPr sz="1900"/>
+            <a:endParaRPr sz="1900" dirty="0"/>
           </a:p>
           <a:p>
             <a:pPr marL="457200" lvl="0" indent="0" algn="l" rtl="0">
@@ -31354,7 +31205,7 @@
               </a:spcAft>
               <a:buNone/>
             </a:pPr>
-            <a:endParaRPr sz="1900"/>
+            <a:endParaRPr sz="1900" dirty="0"/>
           </a:p>
           <a:p>
             <a:pPr marL="457200" lvl="0" indent="0" algn="l" rtl="0">
@@ -31362,58 +31213,72 @@
                 <a:spcPts val="1600"/>
               </a:spcBef>
               <a:spcAft>
-                <a:spcPts val="0"/>
+                <a:spcPts val="1600"/>
               </a:spcAft>
               <a:buNone/>
             </a:pPr>
-            <a:endParaRPr sz="1900"/>
-          </a:p>
-          <a:p>
-            <a:pPr marL="457200" lvl="0" indent="0" algn="l" rtl="0">
-              <a:spcBef>
-                <a:spcPts val="1600"/>
-              </a:spcBef>
-              <a:spcAft>
-                <a:spcPts val="1600"/>
-              </a:spcAft>
-              <a:buNone/>
-            </a:pPr>
-            <a:endParaRPr sz="1900"/>
+            <a:endParaRPr sz="1900" dirty="0"/>
           </a:p>
         </p:txBody>
       </p:sp>
       <p:pic>
         <p:nvPicPr>
-          <p:cNvPr id="290" name="Google Shape;290;p68"/>
-          <p:cNvPicPr preferRelativeResize="0"/>
+          <p:cNvPr id="3" name="Picture 2" descr="A picture containing timeline&#10;&#10;Description automatically generated">
+            <a:extLst>
+              <a:ext uri="{FF2B5EF4-FFF2-40B4-BE49-F238E27FC236}">
+                <a16:creationId xmlns:a16="http://schemas.microsoft.com/office/drawing/2014/main" id="{EF11AF91-7D42-A743-A3CD-AAA1F1178700}"/>
+              </a:ext>
+            </a:extLst>
+          </p:cNvPr>
+          <p:cNvPicPr>
+            <a:picLocks noChangeAspect="1"/>
+          </p:cNvPicPr>
           <p:nvPr/>
         </p:nvPicPr>
         <p:blipFill>
-          <a:blip r:embed="rId3">
-            <a:alphaModFix/>
-          </a:blip>
+          <a:blip r:embed="rId3"/>
           <a:stretch>
             <a:fillRect/>
           </a:stretch>
         </p:blipFill>
         <p:spPr>
           <a:xfrm>
-            <a:off x="1088175" y="4781750"/>
-            <a:ext cx="5036025" cy="3241700"/>
+            <a:off x="264850" y="3600988"/>
+            <a:ext cx="5112455" cy="2788612"/>
           </a:xfrm>
           <a:prstGeom prst="rect">
             <a:avLst/>
           </a:prstGeom>
-          <a:noFill/>
-          <a:ln w="9525" cap="flat" cmpd="sng">
-            <a:solidFill>
-              <a:schemeClr val="dk2"/>
-            </a:solidFill>
-            <a:prstDash val="solid"/>
-            <a:round/>
-            <a:headEnd type="none" w="sm" len="sm"/>
-            <a:tailEnd type="none" w="sm" len="sm"/>
-          </a:ln>
+        </p:spPr>
+      </p:pic>
+      <p:pic>
+        <p:nvPicPr>
+          <p:cNvPr id="5" name="Picture 4" descr="Timeline&#10;&#10;Description automatically generated">
+            <a:extLst>
+              <a:ext uri="{FF2B5EF4-FFF2-40B4-BE49-F238E27FC236}">
+                <a16:creationId xmlns:a16="http://schemas.microsoft.com/office/drawing/2014/main" id="{83497305-4177-C349-9C3D-FF0358385059}"/>
+              </a:ext>
+            </a:extLst>
+          </p:cNvPr>
+          <p:cNvPicPr>
+            <a:picLocks noChangeAspect="1"/>
+          </p:cNvPicPr>
+          <p:nvPr/>
+        </p:nvPicPr>
+        <p:blipFill>
+          <a:blip r:embed="rId4"/>
+          <a:stretch>
+            <a:fillRect/>
+          </a:stretch>
+        </p:blipFill>
+        <p:spPr>
+          <a:xfrm>
+            <a:off x="4205460" y="6556278"/>
+            <a:ext cx="3301990" cy="3405717"/>
+          </a:xfrm>
+          <a:prstGeom prst="rect">
+            <a:avLst/>
+          </a:prstGeom>
         </p:spPr>
       </p:pic>
     </p:spTree>
@@ -31517,7 +31382,7 @@
               </a:spcAft>
               <a:buNone/>
             </a:pPr>
-            <a:endParaRPr sz="1900"/>
+            <a:endParaRPr sz="1900" dirty="0"/>
           </a:p>
           <a:p>
             <a:pPr marL="457200" lvl="0" indent="-349250" algn="l" rtl="0">
@@ -31532,7 +31397,7 @@
               <a:buChar char="●"/>
             </a:pPr>
             <a:r>
-              <a:rPr lang="en" sz="1900" b="1">
+              <a:rPr lang="en" sz="1900" b="1" dirty="0">
                 <a:latin typeface="Open Sans"/>
                 <a:ea typeface="Open Sans"/>
                 <a:cs typeface="Open Sans"/>
@@ -31540,7 +31405,7 @@
               </a:rPr>
               <a:t>Question 2: Insert Web Programmer as a new job title</a:t>
             </a:r>
-            <a:endParaRPr sz="1900" b="1">
+            <a:endParaRPr sz="1900" b="1" dirty="0">
               <a:latin typeface="Open Sans"/>
               <a:ea typeface="Open Sans"/>
               <a:cs typeface="Open Sans"/>
@@ -31557,7 +31422,7 @@
               </a:spcAft>
               <a:buNone/>
             </a:pPr>
-            <a:endParaRPr sz="1900" b="1">
+            <a:endParaRPr sz="1900" b="1" dirty="0">
               <a:latin typeface="Open Sans"/>
               <a:ea typeface="Open Sans"/>
               <a:cs typeface="Open Sans"/>
@@ -31583,7 +31448,7 @@
               <a:buNone/>
             </a:pPr>
             <a:r>
-              <a:rPr lang="en" sz="1200">
+              <a:rPr lang="en" sz="1200" dirty="0">
                 <a:solidFill>
                   <a:srgbClr val="525C65"/>
                 </a:solidFill>
@@ -31597,22 +31462,7 @@
               </a:rPr>
               <a:t>    </a:t>
             </a:r>
-            <a:r>
-              <a:rPr lang="en" sz="1200">
-                <a:solidFill>
-                  <a:srgbClr val="FF0000"/>
-                </a:solidFill>
-                <a:highlight>
-                  <a:schemeClr val="lt1"/>
-                </a:highlight>
-                <a:latin typeface="Open Sans"/>
-                <a:ea typeface="Open Sans"/>
-                <a:cs typeface="Open Sans"/>
-                <a:sym typeface="Open Sans"/>
-              </a:rPr>
-              <a:t>** Replace example screenshot below with your response, and include the query in a SQL file</a:t>
-            </a:r>
-            <a:endParaRPr sz="1900" b="1">
+            <a:endParaRPr sz="1900" b="1" dirty="0">
               <a:latin typeface="Open Sans"/>
               <a:ea typeface="Open Sans"/>
               <a:cs typeface="Open Sans"/>
@@ -31622,14 +31472,14 @@
           <a:p>
             <a:pPr marL="0" lvl="0" indent="0" algn="l" rtl="0">
               <a:spcBef>
-                <a:spcPts val="0"/>
+                <a:spcPts val="1600"/>
               </a:spcBef>
               <a:spcAft>
                 <a:spcPts val="0"/>
               </a:spcAft>
               <a:buNone/>
             </a:pPr>
-            <a:endParaRPr sz="1900" b="1">
+            <a:endParaRPr sz="1900" b="1" dirty="0">
               <a:latin typeface="Open Sans"/>
               <a:ea typeface="Open Sans"/>
               <a:cs typeface="Open Sans"/>
@@ -31646,7 +31496,7 @@
               </a:spcAft>
               <a:buNone/>
             </a:pPr>
-            <a:endParaRPr sz="1900" b="1">
+            <a:endParaRPr sz="1900" b="1" dirty="0">
               <a:latin typeface="Open Sans"/>
               <a:ea typeface="Open Sans"/>
               <a:cs typeface="Open Sans"/>
@@ -31663,7 +31513,7 @@
               </a:spcAft>
               <a:buNone/>
             </a:pPr>
-            <a:endParaRPr sz="1900" b="1">
+            <a:endParaRPr sz="1900" b="1" dirty="0">
               <a:latin typeface="Open Sans"/>
               <a:ea typeface="Open Sans"/>
               <a:cs typeface="Open Sans"/>
@@ -31671,7 +31521,7 @@
             </a:endParaRPr>
           </a:p>
           <a:p>
-            <a:pPr marL="0" lvl="0" indent="0" algn="l" rtl="0">
+            <a:pPr marL="457200" lvl="0" indent="0" algn="l" rtl="0">
               <a:spcBef>
                 <a:spcPts val="1600"/>
               </a:spcBef>
@@ -31680,7 +31530,7 @@
               </a:spcAft>
               <a:buNone/>
             </a:pPr>
-            <a:endParaRPr sz="1900" b="1">
+            <a:endParaRPr sz="1900" b="1" dirty="0">
               <a:latin typeface="Open Sans"/>
               <a:ea typeface="Open Sans"/>
               <a:cs typeface="Open Sans"/>
@@ -31688,7 +31538,7 @@
             </a:endParaRPr>
           </a:p>
           <a:p>
-            <a:pPr marL="457200" lvl="0" indent="0" algn="l" rtl="0">
+            <a:pPr marL="0" lvl="0" indent="0" algn="l" rtl="0">
               <a:spcBef>
                 <a:spcPts val="1600"/>
               </a:spcBef>
@@ -31697,7 +31547,7 @@
               </a:spcAft>
               <a:buNone/>
             </a:pPr>
-            <a:endParaRPr sz="1900" b="1">
+            <a:endParaRPr sz="1900" b="1" dirty="0">
               <a:latin typeface="Open Sans"/>
               <a:ea typeface="Open Sans"/>
               <a:cs typeface="Open Sans"/>
@@ -31714,7 +31564,7 @@
               </a:spcAft>
               <a:buNone/>
             </a:pPr>
-            <a:endParaRPr sz="1900" b="1">
+            <a:endParaRPr sz="1900" b="1" dirty="0">
               <a:latin typeface="Open Sans"/>
               <a:ea typeface="Open Sans"/>
               <a:cs typeface="Open Sans"/>
@@ -31731,15 +31581,10 @@
               </a:spcAft>
               <a:buNone/>
             </a:pPr>
-            <a:endParaRPr sz="1900" b="1">
-              <a:latin typeface="Open Sans"/>
-              <a:ea typeface="Open Sans"/>
-              <a:cs typeface="Open Sans"/>
-              <a:sym typeface="Open Sans"/>
-            </a:endParaRPr>
-          </a:p>
-          <a:p>
-            <a:pPr marL="0" lvl="0" indent="0" algn="l" rtl="0">
+            <a:endParaRPr sz="1900" dirty="0"/>
+          </a:p>
+          <a:p>
+            <a:pPr marL="457200" lvl="0" indent="0" algn="l" rtl="0">
               <a:spcBef>
                 <a:spcPts val="1600"/>
               </a:spcBef>
@@ -31748,7 +31593,7 @@
               </a:spcAft>
               <a:buNone/>
             </a:pPr>
-            <a:endParaRPr sz="1900"/>
+            <a:endParaRPr sz="1900" dirty="0"/>
           </a:p>
           <a:p>
             <a:pPr marL="457200" lvl="0" indent="0" algn="l" rtl="0">
@@ -31760,7 +31605,7 @@
               </a:spcAft>
               <a:buNone/>
             </a:pPr>
-            <a:endParaRPr sz="1900"/>
+            <a:endParaRPr sz="1900" dirty="0"/>
           </a:p>
           <a:p>
             <a:pPr marL="457200" lvl="0" indent="0" algn="l" rtl="0">
@@ -31768,58 +31613,42 @@
                 <a:spcPts val="1600"/>
               </a:spcBef>
               <a:spcAft>
-                <a:spcPts val="0"/>
+                <a:spcPts val="1600"/>
               </a:spcAft>
               <a:buNone/>
             </a:pPr>
-            <a:endParaRPr sz="1900"/>
-          </a:p>
-          <a:p>
-            <a:pPr marL="457200" lvl="0" indent="0" algn="l" rtl="0">
-              <a:spcBef>
-                <a:spcPts val="1600"/>
-              </a:spcBef>
-              <a:spcAft>
-                <a:spcPts val="1600"/>
-              </a:spcAft>
-              <a:buNone/>
-            </a:pPr>
-            <a:endParaRPr sz="1900"/>
+            <a:endParaRPr sz="1900" dirty="0"/>
           </a:p>
         </p:txBody>
       </p:sp>
       <p:pic>
         <p:nvPicPr>
-          <p:cNvPr id="297" name="Google Shape;297;p69"/>
-          <p:cNvPicPr preferRelativeResize="0"/>
+          <p:cNvPr id="3" name="Picture 2" descr="Text&#10;&#10;Description automatically generated">
+            <a:extLst>
+              <a:ext uri="{FF2B5EF4-FFF2-40B4-BE49-F238E27FC236}">
+                <a16:creationId xmlns:a16="http://schemas.microsoft.com/office/drawing/2014/main" id="{8DD3AA5E-A660-1345-B9F3-7154D19661A5}"/>
+              </a:ext>
+            </a:extLst>
+          </p:cNvPr>
+          <p:cNvPicPr>
+            <a:picLocks noChangeAspect="1"/>
+          </p:cNvPicPr>
           <p:nvPr/>
         </p:nvPicPr>
         <p:blipFill>
-          <a:blip r:embed="rId3">
-            <a:alphaModFix/>
-          </a:blip>
+          <a:blip r:embed="rId3"/>
           <a:stretch>
             <a:fillRect/>
           </a:stretch>
         </p:blipFill>
         <p:spPr>
           <a:xfrm>
-            <a:off x="1088175" y="4781750"/>
-            <a:ext cx="5036025" cy="3241700"/>
+            <a:off x="791633" y="3593242"/>
+            <a:ext cx="6189133" cy="5594887"/>
           </a:xfrm>
           <a:prstGeom prst="rect">
             <a:avLst/>
           </a:prstGeom>
-          <a:noFill/>
-          <a:ln w="9525" cap="flat" cmpd="sng">
-            <a:solidFill>
-              <a:schemeClr val="dk2"/>
-            </a:solidFill>
-            <a:prstDash val="solid"/>
-            <a:round/>
-            <a:headEnd type="none" w="sm" len="sm"/>
-            <a:tailEnd type="none" w="sm" len="sm"/>
-          </a:ln>
         </p:spPr>
       </p:pic>
     </p:spTree>
@@ -31932,7 +31761,7 @@
               <a:buNone/>
             </a:pPr>
             <a:r>
-              <a:rPr lang="en" sz="1350" b="1">
+              <a:rPr lang="en" sz="1350" b="1" dirty="0">
                 <a:solidFill>
                   <a:srgbClr val="2E3D49"/>
                 </a:solidFill>
@@ -31947,7 +31776,7 @@
               <a:t>  </a:t>
             </a:r>
             <a:r>
-              <a:rPr lang="en" sz="1500" b="1">
+              <a:rPr lang="en" sz="1500" b="1" dirty="0">
                 <a:solidFill>
                   <a:srgbClr val="2E3D49"/>
                 </a:solidFill>
@@ -31961,7 +31790,7 @@
               </a:rPr>
               <a:t>   Business requirement</a:t>
             </a:r>
-            <a:endParaRPr sz="1500" b="1">
+            <a:endParaRPr sz="1500" b="1" dirty="0">
               <a:solidFill>
                 <a:srgbClr val="2E3D49"/>
               </a:solidFill>
@@ -31993,7 +31822,7 @@
               <a:buNone/>
             </a:pPr>
             <a:r>
-              <a:rPr lang="en" sz="1300">
+              <a:rPr lang="en" sz="1300" dirty="0">
                 <a:solidFill>
                   <a:srgbClr val="525C65"/>
                 </a:solidFill>
@@ -32007,7 +31836,7 @@
               </a:rPr>
               <a:t>Tech ABC Corp saw explosive growth with a sudden appearance onto the gaming scene with their new AI-powered video game console. As a result, they have gone from a small 10 person operation to 200 employees and 5 locations in under a year. HR is having trouble keeping up with the growth, since they are still maintaining employee information in a spreadsheet. While that worked for ten employees, it has becoming increasingly cumbersome to manage as the company expands.</a:t>
             </a:r>
-            <a:endParaRPr sz="1300">
+            <a:endParaRPr sz="1300" dirty="0">
               <a:solidFill>
                 <a:srgbClr val="525C65"/>
               </a:solidFill>
@@ -32038,7 +31867,7 @@
               <a:buFont typeface="Arial"/>
               <a:buNone/>
             </a:pPr>
-            <a:endParaRPr sz="1300">
+            <a:endParaRPr sz="1300" dirty="0">
               <a:solidFill>
                 <a:srgbClr val="525C65"/>
               </a:solidFill>
@@ -32070,7 +31899,7 @@
               <a:buNone/>
             </a:pPr>
             <a:r>
-              <a:rPr lang="en" sz="1300">
+              <a:rPr lang="en" sz="1300" dirty="0">
                 <a:solidFill>
                   <a:srgbClr val="525C65"/>
                 </a:solidFill>
@@ -32084,7 +31913,7 @@
               </a:rPr>
               <a:t>As such, the HR department has tasked you, as the new data architect, to design and build a database capable of managing their employee information.</a:t>
             </a:r>
-            <a:endParaRPr sz="1300">
+            <a:endParaRPr sz="1300" dirty="0">
               <a:solidFill>
                 <a:srgbClr val="525C65"/>
               </a:solidFill>
@@ -32115,7 +31944,7 @@
               <a:buFont typeface="Arial"/>
               <a:buNone/>
             </a:pPr>
-            <a:endParaRPr sz="1200">
+            <a:endParaRPr sz="1200" dirty="0">
               <a:solidFill>
                 <a:srgbClr val="525C65"/>
               </a:solidFill>
@@ -32147,7 +31976,7 @@
               <a:buNone/>
             </a:pPr>
             <a:r>
-              <a:rPr lang="en" sz="1500" b="1">
+              <a:rPr lang="en" sz="1500" b="1" dirty="0">
                 <a:solidFill>
                   <a:srgbClr val="2E3D49"/>
                 </a:solidFill>
@@ -32161,7 +31990,7 @@
               </a:rPr>
               <a:t>Dataset</a:t>
             </a:r>
-            <a:endParaRPr sz="1500" b="1">
+            <a:endParaRPr sz="1500" b="1" dirty="0">
               <a:solidFill>
                 <a:srgbClr val="2E3D49"/>
               </a:solidFill>
@@ -32193,7 +32022,7 @@
               <a:buNone/>
             </a:pPr>
             <a:r>
-              <a:rPr lang="en" sz="1300">
+              <a:rPr lang="en" sz="1300" dirty="0">
                 <a:solidFill>
                   <a:srgbClr val="525C65"/>
                 </a:solidFill>
@@ -32208,7 +32037,7 @@
               <a:t>The </a:t>
             </a:r>
             <a:r>
-              <a:rPr lang="en" sz="1300" u="sng">
+              <a:rPr lang="en" sz="1300" u="sng" dirty="0">
                 <a:solidFill>
                   <a:schemeClr val="hlink"/>
                 </a:solidFill>
@@ -32224,7 +32053,7 @@
               <a:t>HR dataset</a:t>
             </a:r>
             <a:r>
-              <a:rPr lang="en" sz="1300">
+              <a:rPr lang="en" sz="1300" dirty="0">
                 <a:solidFill>
                   <a:srgbClr val="525C65"/>
                 </a:solidFill>
@@ -32238,7 +32067,7 @@
               </a:rPr>
               <a:t> you will be working with is an Excel workbook which consists of 206 records, with eleven columns. The data is in human readable format, and has not been normalized at all. The data lists the names of employees at Tech ABC Corp as well as information such as job title, department, manager's name, hire date, start date, end date, work location, and salary.</a:t>
             </a:r>
-            <a:endParaRPr sz="1300">
+            <a:endParaRPr sz="1300" dirty="0">
               <a:solidFill>
                 <a:srgbClr val="525C65"/>
               </a:solidFill>
@@ -32269,7 +32098,7 @@
               <a:buFont typeface="Arial"/>
               <a:buNone/>
             </a:pPr>
-            <a:endParaRPr sz="1300">
+            <a:endParaRPr sz="1300" dirty="0">
               <a:solidFill>
                 <a:srgbClr val="525C65"/>
               </a:solidFill>
@@ -32301,7 +32130,7 @@
               <a:buNone/>
             </a:pPr>
             <a:r>
-              <a:rPr lang="en" sz="1500" b="1">
+              <a:rPr lang="en" sz="1500" b="1" dirty="0">
                 <a:solidFill>
                   <a:srgbClr val="2E3D49"/>
                 </a:solidFill>
@@ -32315,7 +32144,7 @@
               </a:rPr>
               <a:t>IT Department Best Practices</a:t>
             </a:r>
-            <a:endParaRPr sz="1500" b="1">
+            <a:endParaRPr sz="1500" b="1" dirty="0">
               <a:solidFill>
                 <a:srgbClr val="2E3D49"/>
               </a:solidFill>
@@ -32347,7 +32176,7 @@
               <a:buNone/>
             </a:pPr>
             <a:r>
-              <a:rPr lang="en" sz="1300">
+              <a:rPr lang="en" sz="1300" dirty="0">
                 <a:solidFill>
                   <a:srgbClr val="525C65"/>
                 </a:solidFill>
@@ -32362,7 +32191,7 @@
               <a:t>The IT Department has certain Best Practices policies for databases you should follow, as detailed in the </a:t>
             </a:r>
             <a:r>
-              <a:rPr lang="en" sz="1300" u="sng">
+              <a:rPr lang="en" sz="1300" u="sng" dirty="0">
                 <a:solidFill>
                   <a:schemeClr val="hlink"/>
                 </a:solidFill>
@@ -32378,7 +32207,7 @@
               <a:t>Best Practices document</a:t>
             </a:r>
             <a:r>
-              <a:rPr lang="en" sz="1300">
+              <a:rPr lang="en" sz="1300" dirty="0">
                 <a:solidFill>
                   <a:srgbClr val="525C65"/>
                 </a:solidFill>
@@ -32392,7 +32221,7 @@
               </a:rPr>
               <a:t>.</a:t>
             </a:r>
-            <a:endParaRPr sz="1300">
+            <a:endParaRPr sz="1300" dirty="0">
               <a:solidFill>
                 <a:srgbClr val="525C65"/>
               </a:solidFill>
@@ -32415,7 +32244,7 @@
               </a:spcAft>
               <a:buNone/>
             </a:pPr>
-            <a:endParaRPr sz="2200"/>
+            <a:endParaRPr sz="2200" dirty="0"/>
           </a:p>
         </p:txBody>
       </p:sp>
@@ -32520,7 +32349,7 @@
               </a:spcAft>
               <a:buNone/>
             </a:pPr>
-            <a:endParaRPr sz="1900"/>
+            <a:endParaRPr sz="1900" dirty="0"/>
           </a:p>
           <a:p>
             <a:pPr marL="457200" lvl="0" indent="-349250" algn="l" rtl="0">
@@ -32535,7 +32364,7 @@
               <a:buChar char="●"/>
             </a:pPr>
             <a:r>
-              <a:rPr lang="en" sz="1900" b="1">
+              <a:rPr lang="en" sz="1900" b="1" dirty="0">
                 <a:latin typeface="Open Sans"/>
                 <a:ea typeface="Open Sans"/>
                 <a:cs typeface="Open Sans"/>
@@ -32543,7 +32372,7 @@
               </a:rPr>
               <a:t>Question 3: Correct the job title from web programmer to web developer</a:t>
             </a:r>
-            <a:endParaRPr sz="1900" b="1">
+            <a:endParaRPr sz="1900" b="1" dirty="0">
               <a:latin typeface="Open Sans"/>
               <a:ea typeface="Open Sans"/>
               <a:cs typeface="Open Sans"/>
@@ -32564,7 +32393,7 @@
               <a:buNone/>
             </a:pPr>
             <a:r>
-              <a:rPr lang="en" sz="1200">
+              <a:rPr lang="en" sz="1200" dirty="0">
                 <a:solidFill>
                   <a:srgbClr val="525C65"/>
                 </a:solidFill>
@@ -32578,7 +32407,7 @@
               </a:rPr>
               <a:t>     </a:t>
             </a:r>
-            <a:endParaRPr sz="1200">
+            <a:endParaRPr sz="1200" dirty="0">
               <a:solidFill>
                 <a:srgbClr val="525C65"/>
               </a:solidFill>
@@ -32593,9 +32422,6 @@
           </a:p>
           <a:p>
             <a:pPr marL="0" lvl="0" indent="0" algn="l" rtl="0">
-              <a:lnSpc>
-                <a:spcPct val="170000"/>
-              </a:lnSpc>
               <a:spcBef>
                 <a:spcPts val="0"/>
               </a:spcBef>
@@ -32604,37 +32430,7 @@
               </a:spcAft>
               <a:buNone/>
             </a:pPr>
-            <a:r>
-              <a:rPr lang="en" sz="1200">
-                <a:solidFill>
-                  <a:srgbClr val="525C65"/>
-                </a:solidFill>
-                <a:highlight>
-                  <a:schemeClr val="lt1"/>
-                </a:highlight>
-                <a:latin typeface="Open Sans"/>
-                <a:ea typeface="Open Sans"/>
-                <a:cs typeface="Open Sans"/>
-                <a:sym typeface="Open Sans"/>
-              </a:rPr>
-              <a:t>  </a:t>
-            </a:r>
-            <a:r>
-              <a:rPr lang="en" sz="1200">
-                <a:solidFill>
-                  <a:srgbClr val="FF0000"/>
-                </a:solidFill>
-                <a:highlight>
-                  <a:schemeClr val="lt1"/>
-                </a:highlight>
-                <a:latin typeface="Open Sans"/>
-                <a:ea typeface="Open Sans"/>
-                <a:cs typeface="Open Sans"/>
-                <a:sym typeface="Open Sans"/>
-              </a:rPr>
-              <a:t>** Replace example screenshot below with your response, and include the query in a SQL file</a:t>
-            </a:r>
-            <a:endParaRPr sz="1900" b="1">
+            <a:endParaRPr sz="1900" b="1" dirty="0">
               <a:latin typeface="Open Sans"/>
               <a:ea typeface="Open Sans"/>
               <a:cs typeface="Open Sans"/>
@@ -32644,14 +32440,14 @@
           <a:p>
             <a:pPr marL="0" lvl="0" indent="0" algn="l" rtl="0">
               <a:spcBef>
-                <a:spcPts val="0"/>
+                <a:spcPts val="1600"/>
               </a:spcBef>
               <a:spcAft>
                 <a:spcPts val="0"/>
               </a:spcAft>
               <a:buNone/>
             </a:pPr>
-            <a:endParaRPr sz="1900" b="1">
+            <a:endParaRPr sz="1900" b="1" dirty="0">
               <a:latin typeface="Open Sans"/>
               <a:ea typeface="Open Sans"/>
               <a:cs typeface="Open Sans"/>
@@ -32668,7 +32464,7 @@
               </a:spcAft>
               <a:buNone/>
             </a:pPr>
-            <a:endParaRPr sz="1900" b="1">
+            <a:endParaRPr sz="1900" b="1" dirty="0">
               <a:latin typeface="Open Sans"/>
               <a:ea typeface="Open Sans"/>
               <a:cs typeface="Open Sans"/>
@@ -32685,7 +32481,7 @@
               </a:spcAft>
               <a:buNone/>
             </a:pPr>
-            <a:endParaRPr sz="1900" b="1">
+            <a:endParaRPr sz="1900" b="1" dirty="0">
               <a:latin typeface="Open Sans"/>
               <a:ea typeface="Open Sans"/>
               <a:cs typeface="Open Sans"/>
@@ -32693,7 +32489,7 @@
             </a:endParaRPr>
           </a:p>
           <a:p>
-            <a:pPr marL="0" lvl="0" indent="0" algn="l" rtl="0">
+            <a:pPr marL="457200" lvl="0" indent="0" algn="l" rtl="0">
               <a:spcBef>
                 <a:spcPts val="1600"/>
               </a:spcBef>
@@ -32702,7 +32498,7 @@
               </a:spcAft>
               <a:buNone/>
             </a:pPr>
-            <a:endParaRPr sz="1900" b="1">
+            <a:endParaRPr sz="1900" b="1" dirty="0">
               <a:latin typeface="Open Sans"/>
               <a:ea typeface="Open Sans"/>
               <a:cs typeface="Open Sans"/>
@@ -32710,7 +32506,7 @@
             </a:endParaRPr>
           </a:p>
           <a:p>
-            <a:pPr marL="457200" lvl="0" indent="0" algn="l" rtl="0">
+            <a:pPr marL="0" lvl="0" indent="0" algn="l" rtl="0">
               <a:spcBef>
                 <a:spcPts val="1600"/>
               </a:spcBef>
@@ -32719,7 +32515,7 @@
               </a:spcAft>
               <a:buNone/>
             </a:pPr>
-            <a:endParaRPr sz="1900" b="1">
+            <a:endParaRPr sz="1900" b="1" dirty="0">
               <a:latin typeface="Open Sans"/>
               <a:ea typeface="Open Sans"/>
               <a:cs typeface="Open Sans"/>
@@ -32736,7 +32532,7 @@
               </a:spcAft>
               <a:buNone/>
             </a:pPr>
-            <a:endParaRPr sz="1900" b="1">
+            <a:endParaRPr sz="1900" b="1" dirty="0">
               <a:latin typeface="Open Sans"/>
               <a:ea typeface="Open Sans"/>
               <a:cs typeface="Open Sans"/>
@@ -32753,15 +32549,10 @@
               </a:spcAft>
               <a:buNone/>
             </a:pPr>
-            <a:endParaRPr sz="1900" b="1">
-              <a:latin typeface="Open Sans"/>
-              <a:ea typeface="Open Sans"/>
-              <a:cs typeface="Open Sans"/>
-              <a:sym typeface="Open Sans"/>
-            </a:endParaRPr>
-          </a:p>
-          <a:p>
-            <a:pPr marL="0" lvl="0" indent="0" algn="l" rtl="0">
+            <a:endParaRPr sz="1900" dirty="0"/>
+          </a:p>
+          <a:p>
+            <a:pPr marL="457200" lvl="0" indent="0" algn="l" rtl="0">
               <a:spcBef>
                 <a:spcPts val="1600"/>
               </a:spcBef>
@@ -32770,7 +32561,7 @@
               </a:spcAft>
               <a:buNone/>
             </a:pPr>
-            <a:endParaRPr sz="1900"/>
+            <a:endParaRPr sz="1900" dirty="0"/>
           </a:p>
           <a:p>
             <a:pPr marL="457200" lvl="0" indent="0" algn="l" rtl="0">
@@ -32782,7 +32573,7 @@
               </a:spcAft>
               <a:buNone/>
             </a:pPr>
-            <a:endParaRPr sz="1900"/>
+            <a:endParaRPr sz="1900" dirty="0"/>
           </a:p>
           <a:p>
             <a:pPr marL="457200" lvl="0" indent="0" algn="l" rtl="0">
@@ -32790,58 +32581,42 @@
                 <a:spcPts val="1600"/>
               </a:spcBef>
               <a:spcAft>
-                <a:spcPts val="0"/>
+                <a:spcPts val="1600"/>
               </a:spcAft>
               <a:buNone/>
             </a:pPr>
-            <a:endParaRPr sz="1900"/>
-          </a:p>
-          <a:p>
-            <a:pPr marL="457200" lvl="0" indent="0" algn="l" rtl="0">
-              <a:spcBef>
-                <a:spcPts val="1600"/>
-              </a:spcBef>
-              <a:spcAft>
-                <a:spcPts val="1600"/>
-              </a:spcAft>
-              <a:buNone/>
-            </a:pPr>
-            <a:endParaRPr sz="1900"/>
+            <a:endParaRPr sz="1900" dirty="0"/>
           </a:p>
         </p:txBody>
       </p:sp>
       <p:pic>
         <p:nvPicPr>
-          <p:cNvPr id="304" name="Google Shape;304;p70"/>
-          <p:cNvPicPr preferRelativeResize="0"/>
+          <p:cNvPr id="3" name="Picture 2" descr="Text&#10;&#10;Description automatically generated">
+            <a:extLst>
+              <a:ext uri="{FF2B5EF4-FFF2-40B4-BE49-F238E27FC236}">
+                <a16:creationId xmlns:a16="http://schemas.microsoft.com/office/drawing/2014/main" id="{8103F4BC-90D4-8A43-A246-0DFFBF4A48AC}"/>
+              </a:ext>
+            </a:extLst>
+          </p:cNvPr>
+          <p:cNvPicPr>
+            <a:picLocks noChangeAspect="1"/>
+          </p:cNvPicPr>
           <p:nvPr/>
         </p:nvPicPr>
         <p:blipFill>
-          <a:blip r:embed="rId3">
-            <a:alphaModFix/>
-          </a:blip>
+          <a:blip r:embed="rId3"/>
           <a:stretch>
             <a:fillRect/>
           </a:stretch>
         </p:blipFill>
         <p:spPr>
           <a:xfrm>
-            <a:off x="1088175" y="4781750"/>
-            <a:ext cx="5036025" cy="3241700"/>
+            <a:off x="908050" y="4171950"/>
+            <a:ext cx="4838700" cy="3848100"/>
           </a:xfrm>
           <a:prstGeom prst="rect">
             <a:avLst/>
           </a:prstGeom>
-          <a:noFill/>
-          <a:ln w="9525" cap="flat" cmpd="sng">
-            <a:solidFill>
-              <a:schemeClr val="dk2"/>
-            </a:solidFill>
-            <a:prstDash val="solid"/>
-            <a:round/>
-            <a:headEnd type="none" w="sm" len="sm"/>
-            <a:tailEnd type="none" w="sm" len="sm"/>
-          </a:ln>
         </p:spPr>
       </p:pic>
     </p:spTree>
@@ -32945,7 +32720,7 @@
               </a:spcAft>
               <a:buNone/>
             </a:pPr>
-            <a:endParaRPr sz="1900"/>
+            <a:endParaRPr sz="1900" dirty="0"/>
           </a:p>
           <a:p>
             <a:pPr marL="457200" lvl="0" indent="-349250" algn="l" rtl="0">
@@ -32960,7 +32735,7 @@
               <a:buChar char="●"/>
             </a:pPr>
             <a:r>
-              <a:rPr lang="en" sz="1900" b="1">
+              <a:rPr lang="en" sz="1900" b="1" dirty="0">
                 <a:latin typeface="Open Sans"/>
                 <a:ea typeface="Open Sans"/>
                 <a:cs typeface="Open Sans"/>
@@ -32968,7 +32743,7 @@
               </a:rPr>
               <a:t>Question 4: Delete the job title Web Developer from the database</a:t>
             </a:r>
-            <a:endParaRPr sz="1900" b="1">
+            <a:endParaRPr sz="1900" b="1" dirty="0">
               <a:latin typeface="Open Sans"/>
               <a:ea typeface="Open Sans"/>
               <a:cs typeface="Open Sans"/>
@@ -32989,7 +32764,7 @@
               <a:buNone/>
             </a:pPr>
             <a:r>
-              <a:rPr lang="en" sz="1200">
+              <a:rPr lang="en" sz="1200" dirty="0">
                 <a:solidFill>
                   <a:srgbClr val="525C65"/>
                 </a:solidFill>
@@ -33003,7 +32778,7 @@
               </a:rPr>
               <a:t>         </a:t>
             </a:r>
-            <a:endParaRPr sz="1200">
+            <a:endParaRPr sz="1200" dirty="0">
               <a:solidFill>
                 <a:srgbClr val="525C65"/>
               </a:solidFill>
@@ -33018,9 +32793,6 @@
           </a:p>
           <a:p>
             <a:pPr marL="0" lvl="0" indent="0" algn="l" rtl="0">
-              <a:lnSpc>
-                <a:spcPct val="170000"/>
-              </a:lnSpc>
               <a:spcBef>
                 <a:spcPts val="0"/>
               </a:spcBef>
@@ -33029,37 +32801,7 @@
               </a:spcAft>
               <a:buNone/>
             </a:pPr>
-            <a:r>
-              <a:rPr lang="en" sz="1200">
-                <a:solidFill>
-                  <a:srgbClr val="525C65"/>
-                </a:solidFill>
-                <a:highlight>
-                  <a:schemeClr val="lt1"/>
-                </a:highlight>
-                <a:latin typeface="Open Sans"/>
-                <a:ea typeface="Open Sans"/>
-                <a:cs typeface="Open Sans"/>
-                <a:sym typeface="Open Sans"/>
-              </a:rPr>
-              <a:t> </a:t>
-            </a:r>
-            <a:r>
-              <a:rPr lang="en" sz="1200">
-                <a:solidFill>
-                  <a:srgbClr val="FF0000"/>
-                </a:solidFill>
-                <a:highlight>
-                  <a:schemeClr val="lt1"/>
-                </a:highlight>
-                <a:latin typeface="Open Sans"/>
-                <a:ea typeface="Open Sans"/>
-                <a:cs typeface="Open Sans"/>
-                <a:sym typeface="Open Sans"/>
-              </a:rPr>
-              <a:t>** Replace example screenshot below with your response, and include the query in a SQL file</a:t>
-            </a:r>
-            <a:endParaRPr sz="1900" b="1">
+            <a:endParaRPr sz="1900" b="1" dirty="0">
               <a:latin typeface="Open Sans"/>
               <a:ea typeface="Open Sans"/>
               <a:cs typeface="Open Sans"/>
@@ -33069,14 +32811,14 @@
           <a:p>
             <a:pPr marL="0" lvl="0" indent="0" algn="l" rtl="0">
               <a:spcBef>
-                <a:spcPts val="0"/>
+                <a:spcPts val="1600"/>
               </a:spcBef>
               <a:spcAft>
                 <a:spcPts val="0"/>
               </a:spcAft>
               <a:buNone/>
             </a:pPr>
-            <a:endParaRPr sz="1900" b="1">
+            <a:endParaRPr sz="1900" b="1" dirty="0">
               <a:latin typeface="Open Sans"/>
               <a:ea typeface="Open Sans"/>
               <a:cs typeface="Open Sans"/>
@@ -33093,7 +32835,7 @@
               </a:spcAft>
               <a:buNone/>
             </a:pPr>
-            <a:endParaRPr sz="1900" b="1">
+            <a:endParaRPr sz="1900" b="1" dirty="0">
               <a:latin typeface="Open Sans"/>
               <a:ea typeface="Open Sans"/>
               <a:cs typeface="Open Sans"/>
@@ -33110,7 +32852,7 @@
               </a:spcAft>
               <a:buNone/>
             </a:pPr>
-            <a:endParaRPr sz="1900" b="1">
+            <a:endParaRPr sz="1900" b="1" dirty="0">
               <a:latin typeface="Open Sans"/>
               <a:ea typeface="Open Sans"/>
               <a:cs typeface="Open Sans"/>
@@ -33118,7 +32860,7 @@
             </a:endParaRPr>
           </a:p>
           <a:p>
-            <a:pPr marL="0" lvl="0" indent="0" algn="l" rtl="0">
+            <a:pPr marL="457200" lvl="0" indent="0" algn="l" rtl="0">
               <a:spcBef>
                 <a:spcPts val="1600"/>
               </a:spcBef>
@@ -33127,7 +32869,7 @@
               </a:spcAft>
               <a:buNone/>
             </a:pPr>
-            <a:endParaRPr sz="1900" b="1">
+            <a:endParaRPr sz="1900" b="1" dirty="0">
               <a:latin typeface="Open Sans"/>
               <a:ea typeface="Open Sans"/>
               <a:cs typeface="Open Sans"/>
@@ -33135,7 +32877,7 @@
             </a:endParaRPr>
           </a:p>
           <a:p>
-            <a:pPr marL="457200" lvl="0" indent="0" algn="l" rtl="0">
+            <a:pPr marL="0" lvl="0" indent="0" algn="l" rtl="0">
               <a:spcBef>
                 <a:spcPts val="1600"/>
               </a:spcBef>
@@ -33144,7 +32886,7 @@
               </a:spcAft>
               <a:buNone/>
             </a:pPr>
-            <a:endParaRPr sz="1900" b="1">
+            <a:endParaRPr sz="1900" b="1" dirty="0">
               <a:latin typeface="Open Sans"/>
               <a:ea typeface="Open Sans"/>
               <a:cs typeface="Open Sans"/>
@@ -33161,7 +32903,7 @@
               </a:spcAft>
               <a:buNone/>
             </a:pPr>
-            <a:endParaRPr sz="1900" b="1">
+            <a:endParaRPr sz="1900" b="1" dirty="0">
               <a:latin typeface="Open Sans"/>
               <a:ea typeface="Open Sans"/>
               <a:cs typeface="Open Sans"/>
@@ -33178,15 +32920,10 @@
               </a:spcAft>
               <a:buNone/>
             </a:pPr>
-            <a:endParaRPr sz="1900" b="1">
-              <a:latin typeface="Open Sans"/>
-              <a:ea typeface="Open Sans"/>
-              <a:cs typeface="Open Sans"/>
-              <a:sym typeface="Open Sans"/>
-            </a:endParaRPr>
-          </a:p>
-          <a:p>
-            <a:pPr marL="0" lvl="0" indent="0" algn="l" rtl="0">
+            <a:endParaRPr sz="1900" dirty="0"/>
+          </a:p>
+          <a:p>
+            <a:pPr marL="457200" lvl="0" indent="0" algn="l" rtl="0">
               <a:spcBef>
                 <a:spcPts val="1600"/>
               </a:spcBef>
@@ -33195,7 +32932,7 @@
               </a:spcAft>
               <a:buNone/>
             </a:pPr>
-            <a:endParaRPr sz="1900"/>
+            <a:endParaRPr sz="1900" dirty="0"/>
           </a:p>
           <a:p>
             <a:pPr marL="457200" lvl="0" indent="0" algn="l" rtl="0">
@@ -33207,7 +32944,7 @@
               </a:spcAft>
               <a:buNone/>
             </a:pPr>
-            <a:endParaRPr sz="1900"/>
+            <a:endParaRPr sz="1900" dirty="0"/>
           </a:p>
           <a:p>
             <a:pPr marL="457200" lvl="0" indent="0" algn="l" rtl="0">
@@ -33215,58 +32952,42 @@
                 <a:spcPts val="1600"/>
               </a:spcBef>
               <a:spcAft>
-                <a:spcPts val="0"/>
+                <a:spcPts val="1600"/>
               </a:spcAft>
               <a:buNone/>
             </a:pPr>
-            <a:endParaRPr sz="1900"/>
-          </a:p>
-          <a:p>
-            <a:pPr marL="457200" lvl="0" indent="0" algn="l" rtl="0">
-              <a:spcBef>
-                <a:spcPts val="1600"/>
-              </a:spcBef>
-              <a:spcAft>
-                <a:spcPts val="1600"/>
-              </a:spcAft>
-              <a:buNone/>
-            </a:pPr>
-            <a:endParaRPr sz="1900"/>
+            <a:endParaRPr sz="1900" dirty="0"/>
           </a:p>
         </p:txBody>
       </p:sp>
       <p:pic>
         <p:nvPicPr>
-          <p:cNvPr id="311" name="Google Shape;311;p71"/>
-          <p:cNvPicPr preferRelativeResize="0"/>
+          <p:cNvPr id="3" name="Picture 2" descr="Text&#10;&#10;Description automatically generated">
+            <a:extLst>
+              <a:ext uri="{FF2B5EF4-FFF2-40B4-BE49-F238E27FC236}">
+                <a16:creationId xmlns:a16="http://schemas.microsoft.com/office/drawing/2014/main" id="{5743F262-AEAA-E84E-9644-2CAEC5E61F92}"/>
+              </a:ext>
+            </a:extLst>
+          </p:cNvPr>
+          <p:cNvPicPr>
+            <a:picLocks noChangeAspect="1"/>
+          </p:cNvPicPr>
           <p:nvPr/>
         </p:nvPicPr>
         <p:blipFill>
-          <a:blip r:embed="rId3">
-            <a:alphaModFix/>
-          </a:blip>
+          <a:blip r:embed="rId3"/>
           <a:stretch>
             <a:fillRect/>
           </a:stretch>
         </p:blipFill>
         <p:spPr>
           <a:xfrm>
-            <a:off x="1088175" y="4781750"/>
-            <a:ext cx="5036025" cy="3241700"/>
+            <a:off x="740833" y="4013200"/>
+            <a:ext cx="4800600" cy="3505200"/>
           </a:xfrm>
           <a:prstGeom prst="rect">
             <a:avLst/>
           </a:prstGeom>
-          <a:noFill/>
-          <a:ln w="9525" cap="flat" cmpd="sng">
-            <a:solidFill>
-              <a:schemeClr val="dk2"/>
-            </a:solidFill>
-            <a:prstDash val="solid"/>
-            <a:round/>
-            <a:headEnd type="none" w="sm" len="sm"/>
-            <a:tailEnd type="none" w="sm" len="sm"/>
-          </a:ln>
         </p:spPr>
       </p:pic>
     </p:spTree>
@@ -33370,7 +33091,7 @@
               </a:spcAft>
               <a:buNone/>
             </a:pPr>
-            <a:endParaRPr sz="1900"/>
+            <a:endParaRPr sz="1900" dirty="0"/>
           </a:p>
           <a:p>
             <a:pPr marL="457200" lvl="0" indent="-349250" algn="l" rtl="0">
@@ -33385,7 +33106,7 @@
               <a:buChar char="●"/>
             </a:pPr>
             <a:r>
-              <a:rPr lang="en" sz="1900" b="1">
+              <a:rPr lang="en" sz="1900" b="1" dirty="0">
                 <a:latin typeface="Open Sans"/>
                 <a:ea typeface="Open Sans"/>
                 <a:cs typeface="Open Sans"/>
@@ -33393,7 +33114,7 @@
               </a:rPr>
               <a:t>Question 5: How many employees are in each department?</a:t>
             </a:r>
-            <a:endParaRPr sz="1900" b="1">
+            <a:endParaRPr sz="1900" b="1" dirty="0">
               <a:latin typeface="Open Sans"/>
               <a:ea typeface="Open Sans"/>
               <a:cs typeface="Open Sans"/>
@@ -33410,7 +33131,7 @@
               </a:spcAft>
               <a:buNone/>
             </a:pPr>
-            <a:endParaRPr sz="1900" b="1">
+            <a:endParaRPr sz="1900" b="1" dirty="0">
               <a:latin typeface="Open Sans"/>
               <a:ea typeface="Open Sans"/>
               <a:cs typeface="Open Sans"/>
@@ -33419,9 +33140,6 @@
           </a:p>
           <a:p>
             <a:pPr marL="0" lvl="0" indent="0" algn="l" rtl="0">
-              <a:lnSpc>
-                <a:spcPct val="170000"/>
-              </a:lnSpc>
               <a:spcBef>
                 <a:spcPts val="1600"/>
               </a:spcBef>
@@ -33430,37 +33148,7 @@
               </a:spcAft>
               <a:buNone/>
             </a:pPr>
-            <a:r>
-              <a:rPr lang="en" sz="1200">
-                <a:solidFill>
-                  <a:srgbClr val="525C65"/>
-                </a:solidFill>
-                <a:highlight>
-                  <a:schemeClr val="lt1"/>
-                </a:highlight>
-                <a:latin typeface="Open Sans"/>
-                <a:ea typeface="Open Sans"/>
-                <a:cs typeface="Open Sans"/>
-                <a:sym typeface="Open Sans"/>
-              </a:rPr>
-              <a:t>      </a:t>
-            </a:r>
-            <a:r>
-              <a:rPr lang="en" sz="1200">
-                <a:solidFill>
-                  <a:srgbClr val="FF0000"/>
-                </a:solidFill>
-                <a:highlight>
-                  <a:schemeClr val="lt1"/>
-                </a:highlight>
-                <a:latin typeface="Open Sans"/>
-                <a:ea typeface="Open Sans"/>
-                <a:cs typeface="Open Sans"/>
-                <a:sym typeface="Open Sans"/>
-              </a:rPr>
-              <a:t>** Replace example screenshot below with your response, and include the query in a SQL file</a:t>
-            </a:r>
-            <a:endParaRPr sz="1900" b="1">
+            <a:endParaRPr sz="1900" b="1" dirty="0">
               <a:latin typeface="Open Sans"/>
               <a:ea typeface="Open Sans"/>
               <a:cs typeface="Open Sans"/>
@@ -33470,14 +33158,14 @@
           <a:p>
             <a:pPr marL="0" lvl="0" indent="0" algn="l" rtl="0">
               <a:spcBef>
-                <a:spcPts val="0"/>
+                <a:spcPts val="1600"/>
               </a:spcBef>
               <a:spcAft>
                 <a:spcPts val="0"/>
               </a:spcAft>
               <a:buNone/>
             </a:pPr>
-            <a:endParaRPr sz="1900" b="1">
+            <a:endParaRPr sz="1900" b="1" dirty="0">
               <a:latin typeface="Open Sans"/>
               <a:ea typeface="Open Sans"/>
               <a:cs typeface="Open Sans"/>
@@ -33494,7 +33182,7 @@
               </a:spcAft>
               <a:buNone/>
             </a:pPr>
-            <a:endParaRPr sz="1900" b="1">
+            <a:endParaRPr sz="1900" b="1" dirty="0">
               <a:latin typeface="Open Sans"/>
               <a:ea typeface="Open Sans"/>
               <a:cs typeface="Open Sans"/>
@@ -33502,7 +33190,7 @@
             </a:endParaRPr>
           </a:p>
           <a:p>
-            <a:pPr marL="0" lvl="0" indent="0" algn="l" rtl="0">
+            <a:pPr marL="457200" lvl="0" indent="0" algn="l" rtl="0">
               <a:spcBef>
                 <a:spcPts val="1600"/>
               </a:spcBef>
@@ -33511,7 +33199,7 @@
               </a:spcAft>
               <a:buNone/>
             </a:pPr>
-            <a:endParaRPr sz="1900" b="1">
+            <a:endParaRPr sz="1900" b="1" dirty="0">
               <a:latin typeface="Open Sans"/>
               <a:ea typeface="Open Sans"/>
               <a:cs typeface="Open Sans"/>
@@ -33528,7 +33216,7 @@
               </a:spcAft>
               <a:buNone/>
             </a:pPr>
-            <a:endParaRPr sz="1900" b="1">
+            <a:endParaRPr sz="1900" b="1" dirty="0">
               <a:latin typeface="Open Sans"/>
               <a:ea typeface="Open Sans"/>
               <a:cs typeface="Open Sans"/>
@@ -33536,7 +33224,7 @@
             </a:endParaRPr>
           </a:p>
           <a:p>
-            <a:pPr marL="457200" lvl="0" indent="0" algn="l" rtl="0">
+            <a:pPr marL="0" lvl="0" indent="0" algn="l" rtl="0">
               <a:spcBef>
                 <a:spcPts val="1600"/>
               </a:spcBef>
@@ -33545,7 +33233,7 @@
               </a:spcAft>
               <a:buNone/>
             </a:pPr>
-            <a:endParaRPr sz="1900" b="1">
+            <a:endParaRPr sz="1900" b="1" dirty="0">
               <a:latin typeface="Open Sans"/>
               <a:ea typeface="Open Sans"/>
               <a:cs typeface="Open Sans"/>
@@ -33562,15 +33250,10 @@
               </a:spcAft>
               <a:buNone/>
             </a:pPr>
-            <a:endParaRPr sz="1900" b="1">
-              <a:latin typeface="Open Sans"/>
-              <a:ea typeface="Open Sans"/>
-              <a:cs typeface="Open Sans"/>
-              <a:sym typeface="Open Sans"/>
-            </a:endParaRPr>
-          </a:p>
-          <a:p>
-            <a:pPr marL="0" lvl="0" indent="0" algn="l" rtl="0">
+            <a:endParaRPr sz="1900" dirty="0"/>
+          </a:p>
+          <a:p>
+            <a:pPr marL="457200" lvl="0" indent="0" algn="l" rtl="0">
               <a:spcBef>
                 <a:spcPts val="1600"/>
               </a:spcBef>
@@ -33579,15 +33262,10 @@
               </a:spcAft>
               <a:buNone/>
             </a:pPr>
-            <a:endParaRPr sz="1900" b="1">
-              <a:latin typeface="Open Sans"/>
-              <a:ea typeface="Open Sans"/>
-              <a:cs typeface="Open Sans"/>
-              <a:sym typeface="Open Sans"/>
-            </a:endParaRPr>
-          </a:p>
-          <a:p>
-            <a:pPr marL="0" lvl="0" indent="0" algn="l" rtl="0">
+            <a:endParaRPr sz="1900" dirty="0"/>
+          </a:p>
+          <a:p>
+            <a:pPr marL="457200" lvl="0" indent="0" algn="l" rtl="0">
               <a:spcBef>
                 <a:spcPts val="1600"/>
               </a:spcBef>
@@ -33596,7 +33274,7 @@
               </a:spcAft>
               <a:buNone/>
             </a:pPr>
-            <a:endParaRPr sz="1900"/>
+            <a:endParaRPr sz="1900" dirty="0"/>
           </a:p>
           <a:p>
             <a:pPr marL="457200" lvl="0" indent="0" algn="l" rtl="0">
@@ -33604,70 +33282,42 @@
                 <a:spcPts val="1600"/>
               </a:spcBef>
               <a:spcAft>
-                <a:spcPts val="0"/>
+                <a:spcPts val="1600"/>
               </a:spcAft>
               <a:buNone/>
             </a:pPr>
-            <a:endParaRPr sz="1900"/>
-          </a:p>
-          <a:p>
-            <a:pPr marL="457200" lvl="0" indent="0" algn="l" rtl="0">
-              <a:spcBef>
-                <a:spcPts val="1600"/>
-              </a:spcBef>
-              <a:spcAft>
-                <a:spcPts val="0"/>
-              </a:spcAft>
-              <a:buNone/>
-            </a:pPr>
-            <a:endParaRPr sz="1900"/>
-          </a:p>
-          <a:p>
-            <a:pPr marL="457200" lvl="0" indent="0" algn="l" rtl="0">
-              <a:spcBef>
-                <a:spcPts val="1600"/>
-              </a:spcBef>
-              <a:spcAft>
-                <a:spcPts val="1600"/>
-              </a:spcAft>
-              <a:buNone/>
-            </a:pPr>
-            <a:endParaRPr sz="1900"/>
+            <a:endParaRPr sz="1900" dirty="0"/>
           </a:p>
         </p:txBody>
       </p:sp>
       <p:pic>
         <p:nvPicPr>
-          <p:cNvPr id="318" name="Google Shape;318;p72"/>
-          <p:cNvPicPr preferRelativeResize="0"/>
+          <p:cNvPr id="3" name="Picture 2" descr="Text, timeline&#10;&#10;Description automatically generated">
+            <a:extLst>
+              <a:ext uri="{FF2B5EF4-FFF2-40B4-BE49-F238E27FC236}">
+                <a16:creationId xmlns:a16="http://schemas.microsoft.com/office/drawing/2014/main" id="{352BB045-EB42-8942-B6B8-F54E90809A93}"/>
+              </a:ext>
+            </a:extLst>
+          </p:cNvPr>
+          <p:cNvPicPr>
+            <a:picLocks noChangeAspect="1"/>
+          </p:cNvPicPr>
           <p:nvPr/>
         </p:nvPicPr>
         <p:blipFill>
-          <a:blip r:embed="rId3">
-            <a:alphaModFix/>
-          </a:blip>
+          <a:blip r:embed="rId3"/>
           <a:stretch>
             <a:fillRect/>
           </a:stretch>
         </p:blipFill>
         <p:spPr>
           <a:xfrm>
-            <a:off x="1088175" y="4781750"/>
-            <a:ext cx="5036025" cy="3241700"/>
+            <a:off x="590550" y="4051300"/>
+            <a:ext cx="5727700" cy="2717800"/>
           </a:xfrm>
           <a:prstGeom prst="rect">
             <a:avLst/>
           </a:prstGeom>
-          <a:noFill/>
-          <a:ln w="9525" cap="flat" cmpd="sng">
-            <a:solidFill>
-              <a:schemeClr val="dk2"/>
-            </a:solidFill>
-            <a:prstDash val="solid"/>
-            <a:round/>
-            <a:headEnd type="none" w="sm" len="sm"/>
-            <a:tailEnd type="none" w="sm" len="sm"/>
-          </a:ln>
         </p:spPr>
       </p:pic>
     </p:spTree>
@@ -33771,7 +33421,7 @@
               </a:spcAft>
               <a:buNone/>
             </a:pPr>
-            <a:endParaRPr sz="1900"/>
+            <a:endParaRPr sz="1900" dirty="0"/>
           </a:p>
           <a:p>
             <a:pPr marL="457200" lvl="0" indent="-349250" algn="l" rtl="0">
@@ -33786,15 +33436,33 @@
               <a:buChar char="●"/>
             </a:pPr>
             <a:r>
-              <a:rPr lang="en" sz="1900" b="1">
+              <a:rPr lang="en" sz="1900" b="1" dirty="0">
                 <a:latin typeface="Open Sans"/>
                 <a:ea typeface="Open Sans"/>
                 <a:cs typeface="Open Sans"/>
                 <a:sym typeface="Open Sans"/>
               </a:rPr>
-              <a:t>Question 6: Write a query that returns current and past jobs (include employee name, job title, department, manager name, start and end date for position) for employee Toni Lembeck.</a:t>
+              <a:t>Question 6: Write a query that returns current and past jobs (include employee name, job title, department, manager name, start and end date for position) for employee Toni </a:t>
             </a:r>
-            <a:endParaRPr sz="1900" b="1">
+            <a:r>
+              <a:rPr lang="en" sz="1900" b="1" dirty="0" err="1">
+                <a:latin typeface="Open Sans"/>
+                <a:ea typeface="Open Sans"/>
+                <a:cs typeface="Open Sans"/>
+                <a:sym typeface="Open Sans"/>
+              </a:rPr>
+              <a:t>Lembeck</a:t>
+            </a:r>
+            <a:r>
+              <a:rPr lang="en" sz="1900" b="1" dirty="0">
+                <a:latin typeface="Open Sans"/>
+                <a:ea typeface="Open Sans"/>
+                <a:cs typeface="Open Sans"/>
+                <a:sym typeface="Open Sans"/>
+              </a:rPr>
+              <a:t>.</a:t>
+            </a:r>
+            <a:endParaRPr sz="1900" b="1" dirty="0">
               <a:latin typeface="Open Sans"/>
               <a:ea typeface="Open Sans"/>
               <a:cs typeface="Open Sans"/>
@@ -33803,9 +33471,6 @@
           </a:p>
           <a:p>
             <a:pPr marL="0" lvl="0" indent="0" algn="l" rtl="0">
-              <a:lnSpc>
-                <a:spcPct val="170000"/>
-              </a:lnSpc>
               <a:spcBef>
                 <a:spcPts val="1600"/>
               </a:spcBef>
@@ -33814,37 +33479,7 @@
               </a:spcAft>
               <a:buNone/>
             </a:pPr>
-            <a:r>
-              <a:rPr lang="en" sz="1200">
-                <a:solidFill>
-                  <a:srgbClr val="525C65"/>
-                </a:solidFill>
-                <a:highlight>
-                  <a:schemeClr val="lt1"/>
-                </a:highlight>
-                <a:latin typeface="Open Sans"/>
-                <a:ea typeface="Open Sans"/>
-                <a:cs typeface="Open Sans"/>
-                <a:sym typeface="Open Sans"/>
-              </a:rPr>
-              <a:t>          </a:t>
-            </a:r>
-            <a:r>
-              <a:rPr lang="en" sz="1200">
-                <a:solidFill>
-                  <a:srgbClr val="FF0000"/>
-                </a:solidFill>
-                <a:highlight>
-                  <a:schemeClr val="lt1"/>
-                </a:highlight>
-                <a:latin typeface="Open Sans"/>
-                <a:ea typeface="Open Sans"/>
-                <a:cs typeface="Open Sans"/>
-                <a:sym typeface="Open Sans"/>
-              </a:rPr>
-              <a:t>** Replace example screenshot below with your response, and include the query in a SQL file</a:t>
-            </a:r>
-            <a:endParaRPr sz="1900" b="1">
+            <a:endParaRPr sz="1900" b="1" dirty="0">
               <a:latin typeface="Open Sans"/>
               <a:ea typeface="Open Sans"/>
               <a:cs typeface="Open Sans"/>
@@ -33854,14 +33489,14 @@
           <a:p>
             <a:pPr marL="0" lvl="0" indent="0" algn="l" rtl="0">
               <a:spcBef>
-                <a:spcPts val="0"/>
+                <a:spcPts val="1600"/>
               </a:spcBef>
               <a:spcAft>
                 <a:spcPts val="0"/>
               </a:spcAft>
               <a:buNone/>
             </a:pPr>
-            <a:endParaRPr sz="1900" b="1">
+            <a:endParaRPr sz="1900" b="1" dirty="0">
               <a:latin typeface="Open Sans"/>
               <a:ea typeface="Open Sans"/>
               <a:cs typeface="Open Sans"/>
@@ -33878,7 +33513,7 @@
               </a:spcAft>
               <a:buNone/>
             </a:pPr>
-            <a:endParaRPr sz="1900" b="1">
+            <a:endParaRPr sz="1900" b="1" dirty="0">
               <a:latin typeface="Open Sans"/>
               <a:ea typeface="Open Sans"/>
               <a:cs typeface="Open Sans"/>
@@ -33886,7 +33521,7 @@
             </a:endParaRPr>
           </a:p>
           <a:p>
-            <a:pPr marL="0" lvl="0" indent="0" algn="l" rtl="0">
+            <a:pPr marL="457200" lvl="0" indent="0" algn="l" rtl="0">
               <a:spcBef>
                 <a:spcPts val="1600"/>
               </a:spcBef>
@@ -33895,7 +33530,7 @@
               </a:spcAft>
               <a:buNone/>
             </a:pPr>
-            <a:endParaRPr sz="1900" b="1">
+            <a:endParaRPr sz="1900" b="1" dirty="0">
               <a:latin typeface="Open Sans"/>
               <a:ea typeface="Open Sans"/>
               <a:cs typeface="Open Sans"/>
@@ -33912,7 +33547,7 @@
               </a:spcAft>
               <a:buNone/>
             </a:pPr>
-            <a:endParaRPr sz="1900" b="1">
+            <a:endParaRPr sz="1900" b="1" dirty="0">
               <a:latin typeface="Open Sans"/>
               <a:ea typeface="Open Sans"/>
               <a:cs typeface="Open Sans"/>
@@ -33920,7 +33555,7 @@
             </a:endParaRPr>
           </a:p>
           <a:p>
-            <a:pPr marL="457200" lvl="0" indent="0" algn="l" rtl="0">
+            <a:pPr marL="0" lvl="0" indent="0" algn="l" rtl="0">
               <a:spcBef>
                 <a:spcPts val="1600"/>
               </a:spcBef>
@@ -33929,7 +33564,7 @@
               </a:spcAft>
               <a:buNone/>
             </a:pPr>
-            <a:endParaRPr sz="1900" b="1">
+            <a:endParaRPr sz="1900" b="1" dirty="0">
               <a:latin typeface="Open Sans"/>
               <a:ea typeface="Open Sans"/>
               <a:cs typeface="Open Sans"/>
@@ -33946,15 +33581,10 @@
               </a:spcAft>
               <a:buNone/>
             </a:pPr>
-            <a:endParaRPr sz="1900" b="1">
-              <a:latin typeface="Open Sans"/>
-              <a:ea typeface="Open Sans"/>
-              <a:cs typeface="Open Sans"/>
-              <a:sym typeface="Open Sans"/>
-            </a:endParaRPr>
-          </a:p>
-          <a:p>
-            <a:pPr marL="0" lvl="0" indent="0" algn="l" rtl="0">
+            <a:endParaRPr sz="1900" dirty="0"/>
+          </a:p>
+          <a:p>
+            <a:pPr marL="457200" lvl="0" indent="0" algn="l" rtl="0">
               <a:spcBef>
                 <a:spcPts val="1600"/>
               </a:spcBef>
@@ -33963,15 +33593,10 @@
               </a:spcAft>
               <a:buNone/>
             </a:pPr>
-            <a:endParaRPr sz="1900" b="1">
-              <a:latin typeface="Open Sans"/>
-              <a:ea typeface="Open Sans"/>
-              <a:cs typeface="Open Sans"/>
-              <a:sym typeface="Open Sans"/>
-            </a:endParaRPr>
-          </a:p>
-          <a:p>
-            <a:pPr marL="0" lvl="0" indent="0" algn="l" rtl="0">
+            <a:endParaRPr sz="1900" dirty="0"/>
+          </a:p>
+          <a:p>
+            <a:pPr marL="457200" lvl="0" indent="0" algn="l" rtl="0">
               <a:spcBef>
                 <a:spcPts val="1600"/>
               </a:spcBef>
@@ -33980,7 +33605,7 @@
               </a:spcAft>
               <a:buNone/>
             </a:pPr>
-            <a:endParaRPr sz="1900"/>
+            <a:endParaRPr sz="1900" dirty="0"/>
           </a:p>
           <a:p>
             <a:pPr marL="457200" lvl="0" indent="0" algn="l" rtl="0">
@@ -33988,70 +33613,42 @@
                 <a:spcPts val="1600"/>
               </a:spcBef>
               <a:spcAft>
-                <a:spcPts val="0"/>
+                <a:spcPts val="1600"/>
               </a:spcAft>
               <a:buNone/>
             </a:pPr>
-            <a:endParaRPr sz="1900"/>
-          </a:p>
-          <a:p>
-            <a:pPr marL="457200" lvl="0" indent="0" algn="l" rtl="0">
-              <a:spcBef>
-                <a:spcPts val="1600"/>
-              </a:spcBef>
-              <a:spcAft>
-                <a:spcPts val="0"/>
-              </a:spcAft>
-              <a:buNone/>
-            </a:pPr>
-            <a:endParaRPr sz="1900"/>
-          </a:p>
-          <a:p>
-            <a:pPr marL="457200" lvl="0" indent="0" algn="l" rtl="0">
-              <a:spcBef>
-                <a:spcPts val="1600"/>
-              </a:spcBef>
-              <a:spcAft>
-                <a:spcPts val="1600"/>
-              </a:spcAft>
-              <a:buNone/>
-            </a:pPr>
-            <a:endParaRPr sz="1900"/>
+            <a:endParaRPr sz="1900" dirty="0"/>
           </a:p>
         </p:txBody>
       </p:sp>
       <p:pic>
         <p:nvPicPr>
-          <p:cNvPr id="325" name="Google Shape;325;p73"/>
-          <p:cNvPicPr preferRelativeResize="0"/>
+          <p:cNvPr id="3" name="Picture 2" descr="Text&#10;&#10;Description automatically generated">
+            <a:extLst>
+              <a:ext uri="{FF2B5EF4-FFF2-40B4-BE49-F238E27FC236}">
+                <a16:creationId xmlns:a16="http://schemas.microsoft.com/office/drawing/2014/main" id="{056B7D67-A4E8-5346-9DC2-58ED0F74E894}"/>
+              </a:ext>
+            </a:extLst>
+          </p:cNvPr>
+          <p:cNvPicPr>
+            <a:picLocks noChangeAspect="1"/>
+          </p:cNvPicPr>
           <p:nvPr/>
         </p:nvPicPr>
         <p:blipFill>
-          <a:blip r:embed="rId3">
-            <a:alphaModFix/>
-          </a:blip>
+          <a:blip r:embed="rId3"/>
           <a:stretch>
             <a:fillRect/>
           </a:stretch>
         </p:blipFill>
         <p:spPr>
           <a:xfrm>
-            <a:off x="1088175" y="4781750"/>
-            <a:ext cx="5036025" cy="3241700"/>
+            <a:off x="393700" y="4834834"/>
+            <a:ext cx="6985000" cy="1621371"/>
           </a:xfrm>
           <a:prstGeom prst="rect">
             <a:avLst/>
           </a:prstGeom>
-          <a:noFill/>
-          <a:ln w="9525" cap="flat" cmpd="sng">
-            <a:solidFill>
-              <a:schemeClr val="dk2"/>
-            </a:solidFill>
-            <a:prstDash val="solid"/>
-            <a:round/>
-            <a:headEnd type="none" w="sm" len="sm"/>
-            <a:tailEnd type="none" w="sm" len="sm"/>
-          </a:ln>
         </p:spPr>
       </p:pic>
     </p:spTree>
@@ -34174,7 +33771,7 @@
             </a:endParaRPr>
           </a:p>
           <a:p>
-            <a:pPr marL="0" lvl="0" indent="0" algn="l" rtl="0">
+            <a:pPr marL="457200" lvl="0" indent="0" algn="l" rtl="0">
               <a:spcBef>
                 <a:spcPts val="1600"/>
               </a:spcBef>
@@ -34184,38 +33781,15 @@
               <a:buNone/>
             </a:pPr>
             <a:r>
-              <a:rPr lang="en" sz="1900" b="1" dirty="0">
-                <a:solidFill>
-                  <a:srgbClr val="FF0000"/>
-                </a:solidFill>
+              <a:rPr lang="en-US" sz="1900" dirty="0">
                 <a:latin typeface="Open Sans"/>
                 <a:ea typeface="Open Sans"/>
                 <a:cs typeface="Open Sans"/>
                 <a:sym typeface="Open Sans"/>
               </a:rPr>
-              <a:t>** answer in a short paragraph, how you would apply table security to restrict access to employee salaries</a:t>
+              <a:t>The best way to assign permissions are through groups. There will be two groups. The first group contains HR and high level managers. This group has read and write access to all tables including the salary table. The second group contains everyone else in the company. This group has read access only to all tables except the salary table.</a:t>
             </a:r>
-            <a:endParaRPr sz="1900" b="1" dirty="0">
-              <a:solidFill>
-                <a:srgbClr val="FF0000"/>
-              </a:solidFill>
-              <a:latin typeface="Open Sans"/>
-              <a:ea typeface="Open Sans"/>
-              <a:cs typeface="Open Sans"/>
-              <a:sym typeface="Open Sans"/>
-            </a:endParaRPr>
-          </a:p>
-          <a:p>
-            <a:pPr marL="457200" lvl="0" indent="0" algn="l" rtl="0">
-              <a:spcBef>
-                <a:spcPts val="1600"/>
-              </a:spcBef>
-              <a:spcAft>
-                <a:spcPts val="0"/>
-              </a:spcAft>
-              <a:buNone/>
-            </a:pPr>
-            <a:endParaRPr sz="1900" b="1" dirty="0">
+            <a:endParaRPr sz="1900" dirty="0">
               <a:latin typeface="Open Sans"/>
               <a:ea typeface="Open Sans"/>
               <a:cs typeface="Open Sans"/>
@@ -37463,56 +37037,156 @@
               <a:buNone/>
             </a:pPr>
             <a:r>
-              <a:rPr lang="en" sz="1700" dirty="0"/>
-              <a:t>List the database objects (tables, views, special procedures)  that will be created for the database. </a:t>
+              <a:rPr lang="en-US" sz="1700" dirty="0"/>
+              <a:t>The following database tables will be created for this project:</a:t>
             </a:r>
-            <a:endParaRPr sz="1700" dirty="0"/>
-          </a:p>
-          <a:p>
-            <a:pPr marL="457200" lvl="0" indent="0" algn="l" rtl="0">
-              <a:lnSpc>
-                <a:spcPct val="100000"/>
-              </a:lnSpc>
-              <a:spcBef>
-                <a:spcPts val="0"/>
-              </a:spcBef>
-              <a:spcAft>
-                <a:spcPts val="0"/>
-              </a:spcAft>
-              <a:buNone/>
-            </a:pPr>
-            <a:endParaRPr sz="1700" dirty="0"/>
-          </a:p>
-          <a:p>
-            <a:pPr marL="457200" lvl="0" indent="0" algn="l" rtl="0">
-              <a:lnSpc>
-                <a:spcPct val="100000"/>
-              </a:lnSpc>
-              <a:spcBef>
-                <a:spcPts val="0"/>
-              </a:spcBef>
-              <a:spcAft>
-                <a:spcPts val="0"/>
-              </a:spcAft>
-              <a:buNone/>
+          </a:p>
+          <a:p>
+            <a:pPr marL="742950" indent="-285750">
+              <a:lnSpc>
+                <a:spcPct val="100000"/>
+              </a:lnSpc>
+              <a:spcBef>
+                <a:spcPts val="1600"/>
+              </a:spcBef>
+              <a:buFont typeface="Arial" panose="020B0604020202020204" pitchFamily="34" charset="0"/>
+              <a:buChar char="•"/>
             </a:pPr>
             <a:r>
-              <a:rPr lang="en" sz="1700" dirty="0"/>
-              <a:t>Hint - you may want to circle back to this answer after completing the logical ERD in step 2.</a:t>
+              <a:rPr lang="en-US" sz="1200" dirty="0"/>
+              <a:t>Employee</a:t>
             </a:r>
-            <a:endParaRPr sz="1700" dirty="0"/>
-          </a:p>
-          <a:p>
-            <a:pPr marL="457200" lvl="0" indent="0" algn="l" rtl="0">
-              <a:spcBef>
-                <a:spcPts val="0"/>
-              </a:spcBef>
-              <a:spcAft>
-                <a:spcPts val="0"/>
-              </a:spcAft>
-              <a:buNone/>
+          </a:p>
+          <a:p>
+            <a:pPr marL="742950" indent="-285750">
+              <a:lnSpc>
+                <a:spcPct val="100000"/>
+              </a:lnSpc>
+              <a:spcBef>
+                <a:spcPts val="1600"/>
+              </a:spcBef>
+              <a:buFont typeface="Arial" panose="020B0604020202020204" pitchFamily="34" charset="0"/>
+              <a:buChar char="•"/>
             </a:pPr>
-            <a:endParaRPr sz="1900" dirty="0"/>
+            <a:r>
+              <a:rPr lang="en-US" sz="1200" dirty="0"/>
+              <a:t>Education</a:t>
+            </a:r>
+          </a:p>
+          <a:p>
+            <a:pPr marL="742950" indent="-285750">
+              <a:lnSpc>
+                <a:spcPct val="100000"/>
+              </a:lnSpc>
+              <a:spcBef>
+                <a:spcPts val="1600"/>
+              </a:spcBef>
+              <a:buFont typeface="Arial" panose="020B0604020202020204" pitchFamily="34" charset="0"/>
+              <a:buChar char="•"/>
+            </a:pPr>
+            <a:r>
+              <a:rPr lang="en-US" sz="1200" dirty="0" err="1"/>
+              <a:t>JobMapping</a:t>
+            </a:r>
+            <a:endParaRPr lang="en-US" sz="1200" dirty="0"/>
+          </a:p>
+          <a:p>
+            <a:pPr marL="742950" indent="-285750">
+              <a:lnSpc>
+                <a:spcPct val="100000"/>
+              </a:lnSpc>
+              <a:spcBef>
+                <a:spcPts val="1600"/>
+              </a:spcBef>
+              <a:buFont typeface="Arial" panose="020B0604020202020204" pitchFamily="34" charset="0"/>
+              <a:buChar char="•"/>
+            </a:pPr>
+            <a:r>
+              <a:rPr lang="en-US" sz="1200" dirty="0"/>
+              <a:t>Job</a:t>
+            </a:r>
+          </a:p>
+          <a:p>
+            <a:pPr marL="742950" indent="-285750">
+              <a:lnSpc>
+                <a:spcPct val="100000"/>
+              </a:lnSpc>
+              <a:spcBef>
+                <a:spcPts val="1600"/>
+              </a:spcBef>
+              <a:buFont typeface="Arial" panose="020B0604020202020204" pitchFamily="34" charset="0"/>
+              <a:buChar char="•"/>
+            </a:pPr>
+            <a:r>
+              <a:rPr lang="en-US" sz="1200" dirty="0"/>
+              <a:t>Salary</a:t>
+            </a:r>
+          </a:p>
+          <a:p>
+            <a:pPr marL="742950" indent="-285750">
+              <a:lnSpc>
+                <a:spcPct val="100000"/>
+              </a:lnSpc>
+              <a:spcBef>
+                <a:spcPts val="1600"/>
+              </a:spcBef>
+              <a:buFont typeface="Arial" panose="020B0604020202020204" pitchFamily="34" charset="0"/>
+              <a:buChar char="•"/>
+            </a:pPr>
+            <a:r>
+              <a:rPr lang="en-US" sz="1200" dirty="0"/>
+              <a:t>Department</a:t>
+            </a:r>
+          </a:p>
+          <a:p>
+            <a:pPr marL="742950" indent="-285750">
+              <a:lnSpc>
+                <a:spcPct val="100000"/>
+              </a:lnSpc>
+              <a:spcBef>
+                <a:spcPts val="1600"/>
+              </a:spcBef>
+              <a:buFont typeface="Arial" panose="020B0604020202020204" pitchFamily="34" charset="0"/>
+              <a:buChar char="•"/>
+            </a:pPr>
+            <a:r>
+              <a:rPr lang="en-US" sz="1200" dirty="0" err="1"/>
+              <a:t>OfficeLocation</a:t>
+            </a:r>
+            <a:endParaRPr lang="en-US" sz="1200" dirty="0"/>
+          </a:p>
+          <a:p>
+            <a:pPr marL="742950" indent="-285750">
+              <a:lnSpc>
+                <a:spcPct val="100000"/>
+              </a:lnSpc>
+              <a:spcBef>
+                <a:spcPts val="1600"/>
+              </a:spcBef>
+              <a:buFont typeface="Arial" panose="020B0604020202020204" pitchFamily="34" charset="0"/>
+              <a:buChar char="•"/>
+            </a:pPr>
+            <a:r>
+              <a:rPr lang="en-US" sz="1200" dirty="0"/>
+              <a:t>City</a:t>
+            </a:r>
+          </a:p>
+          <a:p>
+            <a:pPr marL="742950" indent="-285750">
+              <a:lnSpc>
+                <a:spcPct val="100000"/>
+              </a:lnSpc>
+              <a:spcBef>
+                <a:spcPts val="1600"/>
+              </a:spcBef>
+              <a:buFont typeface="Arial" panose="020B0604020202020204" pitchFamily="34" charset="0"/>
+              <a:buChar char="•"/>
+            </a:pPr>
+            <a:r>
+              <a:rPr lang="en-US" sz="1200" dirty="0"/>
+              <a:t>State</a:t>
+            </a:r>
+            <a:endParaRPr sz="1200" dirty="0"/>
           </a:p>
           <a:p>
             <a:pPr marL="457200" lvl="0" indent="-349250" algn="l" rtl="0">
@@ -37980,7 +37654,30 @@
                 <a:cs typeface="Open Sans"/>
                 <a:sym typeface="Open Sans"/>
               </a:rPr>
-              <a:t>Data has to be kept 7 years per regulation</a:t>
+              <a:t>Data has to be kept 7 years per regulation.</a:t>
+            </a:r>
+          </a:p>
+          <a:p>
+            <a:pPr marL="457200" lvl="0" indent="0" algn="l" rtl="0">
+              <a:lnSpc>
+                <a:spcPct val="100000"/>
+              </a:lnSpc>
+              <a:spcBef>
+                <a:spcPts val="0"/>
+              </a:spcBef>
+              <a:spcAft>
+                <a:spcPts val="0"/>
+              </a:spcAft>
+              <a:buNone/>
+            </a:pPr>
+            <a:r>
+              <a:rPr lang="en" sz="1700" dirty="0">
+                <a:latin typeface="Open Sans"/>
+                <a:ea typeface="Open Sans"/>
+                <a:cs typeface="Open Sans"/>
+                <a:sym typeface="Open Sans"/>
+              </a:rPr>
+              <a:t>In memory storage is expensive and not necessary for this project.</a:t>
             </a:r>
             <a:endParaRPr sz="1700" dirty="0"/>
           </a:p>

</xml_diff>

<commit_message>
removed state and city table. updated all ID fields. fixed answers.
</commit_message>
<xml_diff>
--- a/Proposal.pptx
+++ b/Proposal.pptx
@@ -28872,10 +28872,10 @@
       </p:sp>
       <p:pic>
         <p:nvPicPr>
-          <p:cNvPr id="3" name="Picture 2" descr="Diagram&#10;&#10;Description automatically generated">
+          <p:cNvPr id="4" name="Picture 3" descr="Diagram&#10;&#10;Description automatically generated">
             <a:extLst>
               <a:ext uri="{FF2B5EF4-FFF2-40B4-BE49-F238E27FC236}">
-                <a16:creationId xmlns:a16="http://schemas.microsoft.com/office/drawing/2014/main" id="{CA470CD7-0D02-DC4D-901C-F7BF0E2B114E}"/>
+                <a16:creationId xmlns:a16="http://schemas.microsoft.com/office/drawing/2014/main" id="{A3574C21-47A4-EF43-915F-0EF445920088}"/>
               </a:ext>
             </a:extLst>
           </p:cNvPr>
@@ -28892,8 +28892,8 @@
         </p:blipFill>
         <p:spPr>
           <a:xfrm>
-            <a:off x="541867" y="5587999"/>
-            <a:ext cx="6856566" cy="2091189"/>
+            <a:off x="415575" y="5288280"/>
+            <a:ext cx="6941249" cy="3450269"/>
           </a:xfrm>
           <a:prstGeom prst="rect">
             <a:avLst/>
@@ -29226,10 +29226,10 @@
       </p:sp>
       <p:pic>
         <p:nvPicPr>
-          <p:cNvPr id="3" name="Picture 2" descr="Diagram&#10;&#10;Description automatically generated">
+          <p:cNvPr id="6" name="Picture 5" descr="Diagram&#10;&#10;Description automatically generated">
             <a:extLst>
               <a:ext uri="{FF2B5EF4-FFF2-40B4-BE49-F238E27FC236}">
-                <a16:creationId xmlns:a16="http://schemas.microsoft.com/office/drawing/2014/main" id="{D8836254-AB93-084A-A193-A7EE4FB97134}"/>
+                <a16:creationId xmlns:a16="http://schemas.microsoft.com/office/drawing/2014/main" id="{659297B2-FD5F-534E-98FA-0E04DC9F3258}"/>
               </a:ext>
             </a:extLst>
           </p:cNvPr>
@@ -29246,8 +29246,8 @@
         </p:blipFill>
         <p:spPr>
           <a:xfrm>
-            <a:off x="373914" y="5602834"/>
-            <a:ext cx="7133536" cy="3515766"/>
+            <a:off x="780120" y="5349240"/>
+            <a:ext cx="6009504" cy="4550549"/>
           </a:xfrm>
           <a:prstGeom prst="rect">
             <a:avLst/>
@@ -29441,10 +29441,10 @@
       </p:sp>
       <p:pic>
         <p:nvPicPr>
-          <p:cNvPr id="3" name="Picture 2" descr="Graphical user interface&#10;&#10;Description automatically generated">
+          <p:cNvPr id="4" name="Picture 3" descr="Diagram&#10;&#10;Description automatically generated">
             <a:extLst>
               <a:ext uri="{FF2B5EF4-FFF2-40B4-BE49-F238E27FC236}">
-                <a16:creationId xmlns:a16="http://schemas.microsoft.com/office/drawing/2014/main" id="{1153D9EE-2A91-0047-9A55-3A3F8C00C1FC}"/>
+                <a16:creationId xmlns:a16="http://schemas.microsoft.com/office/drawing/2014/main" id="{8567AB50-8800-7840-A2A1-7B0683123E97}"/>
               </a:ext>
             </a:extLst>
           </p:cNvPr>
@@ -29461,8 +29461,8 @@
         </p:blipFill>
         <p:spPr>
           <a:xfrm>
-            <a:off x="264850" y="5691825"/>
-            <a:ext cx="7242600" cy="2495896"/>
+            <a:off x="110926" y="5432282"/>
+            <a:ext cx="7550547" cy="3673618"/>
           </a:xfrm>
           <a:prstGeom prst="rect">
             <a:avLst/>
@@ -30887,10 +30887,10 @@
       </p:sp>
       <p:pic>
         <p:nvPicPr>
-          <p:cNvPr id="3" name="Picture 2" descr="Text&#10;&#10;Description automatically generated">
+          <p:cNvPr id="4" name="Picture 3" descr="Text&#10;&#10;Description automatically generated">
             <a:extLst>
               <a:ext uri="{FF2B5EF4-FFF2-40B4-BE49-F238E27FC236}">
-                <a16:creationId xmlns:a16="http://schemas.microsoft.com/office/drawing/2014/main" id="{E63EE616-7322-CB4A-8011-83460FF3C62F}"/>
+                <a16:creationId xmlns:a16="http://schemas.microsoft.com/office/drawing/2014/main" id="{AD7F3BC8-FFB1-7A41-A3BB-81F91677E738}"/>
               </a:ext>
             </a:extLst>
           </p:cNvPr>
@@ -30907,8 +30907,8 @@
         </p:blipFill>
         <p:spPr>
           <a:xfrm>
-            <a:off x="2455334" y="4868333"/>
-            <a:ext cx="2230159" cy="5029200"/>
+            <a:off x="3594049" y="4622616"/>
+            <a:ext cx="3423971" cy="5275764"/>
           </a:xfrm>
           <a:prstGeom prst="rect">
             <a:avLst/>
@@ -31223,10 +31223,10 @@
       </p:sp>
       <p:pic>
         <p:nvPicPr>
-          <p:cNvPr id="3" name="Picture 2" descr="A picture containing timeline&#10;&#10;Description automatically generated">
+          <p:cNvPr id="4" name="Picture 3" descr="Timeline&#10;&#10;Description automatically generated">
             <a:extLst>
               <a:ext uri="{FF2B5EF4-FFF2-40B4-BE49-F238E27FC236}">
-                <a16:creationId xmlns:a16="http://schemas.microsoft.com/office/drawing/2014/main" id="{EF11AF91-7D42-A743-A3CD-AAA1F1178700}"/>
+                <a16:creationId xmlns:a16="http://schemas.microsoft.com/office/drawing/2014/main" id="{130D416A-5A12-B447-9151-4588BAA7477E}"/>
               </a:ext>
             </a:extLst>
           </p:cNvPr>
@@ -31243,38 +31243,8 @@
         </p:blipFill>
         <p:spPr>
           <a:xfrm>
-            <a:off x="264850" y="3600988"/>
-            <a:ext cx="5112455" cy="2788612"/>
-          </a:xfrm>
-          <a:prstGeom prst="rect">
-            <a:avLst/>
-          </a:prstGeom>
-        </p:spPr>
-      </p:pic>
-      <p:pic>
-        <p:nvPicPr>
-          <p:cNvPr id="5" name="Picture 4" descr="Timeline&#10;&#10;Description automatically generated">
-            <a:extLst>
-              <a:ext uri="{FF2B5EF4-FFF2-40B4-BE49-F238E27FC236}">
-                <a16:creationId xmlns:a16="http://schemas.microsoft.com/office/drawing/2014/main" id="{83497305-4177-C349-9C3D-FF0358385059}"/>
-              </a:ext>
-            </a:extLst>
-          </p:cNvPr>
-          <p:cNvPicPr>
-            <a:picLocks noChangeAspect="1"/>
-          </p:cNvPicPr>
-          <p:nvPr/>
-        </p:nvPicPr>
-        <p:blipFill>
-          <a:blip r:embed="rId4"/>
-          <a:stretch>
-            <a:fillRect/>
-          </a:stretch>
-        </p:blipFill>
-        <p:spPr>
-          <a:xfrm>
-            <a:off x="4205460" y="6556278"/>
-            <a:ext cx="3301990" cy="3405717"/>
+            <a:off x="669356" y="3781739"/>
+            <a:ext cx="5121843" cy="5406390"/>
           </a:xfrm>
           <a:prstGeom prst="rect">
             <a:avLst/>
@@ -33292,10 +33262,10 @@
       </p:sp>
       <p:pic>
         <p:nvPicPr>
-          <p:cNvPr id="3" name="Picture 2" descr="Text, timeline&#10;&#10;Description automatically generated">
+          <p:cNvPr id="4" name="Picture 3" descr="Text&#10;&#10;Description automatically generated">
             <a:extLst>
               <a:ext uri="{FF2B5EF4-FFF2-40B4-BE49-F238E27FC236}">
-                <a16:creationId xmlns:a16="http://schemas.microsoft.com/office/drawing/2014/main" id="{352BB045-EB42-8942-B6B8-F54E90809A93}"/>
+                <a16:creationId xmlns:a16="http://schemas.microsoft.com/office/drawing/2014/main" id="{3378026E-0C1B-BB48-B636-9C563DF25510}"/>
               </a:ext>
             </a:extLst>
           </p:cNvPr>
@@ -33312,8 +33282,8 @@
         </p:blipFill>
         <p:spPr>
           <a:xfrm>
-            <a:off x="590550" y="4051300"/>
-            <a:ext cx="5727700" cy="2717800"/>
+            <a:off x="419100" y="3587750"/>
+            <a:ext cx="6934200" cy="2882900"/>
           </a:xfrm>
           <a:prstGeom prst="rect">
             <a:avLst/>
@@ -33623,10 +33593,10 @@
       </p:sp>
       <p:pic>
         <p:nvPicPr>
-          <p:cNvPr id="3" name="Picture 2" descr="Text&#10;&#10;Description automatically generated">
+          <p:cNvPr id="4" name="Picture 3" descr="Text&#10;&#10;Description automatically generated">
             <a:extLst>
               <a:ext uri="{FF2B5EF4-FFF2-40B4-BE49-F238E27FC236}">
-                <a16:creationId xmlns:a16="http://schemas.microsoft.com/office/drawing/2014/main" id="{056B7D67-A4E8-5346-9DC2-58ED0F74E894}"/>
+                <a16:creationId xmlns:a16="http://schemas.microsoft.com/office/drawing/2014/main" id="{3B7BCD6A-8668-394D-94AE-08766AB645A6}"/>
               </a:ext>
             </a:extLst>
           </p:cNvPr>
@@ -33643,8 +33613,8 @@
         </p:blipFill>
         <p:spPr>
           <a:xfrm>
-            <a:off x="393700" y="4834834"/>
-            <a:ext cx="6985000" cy="1621371"/>
+            <a:off x="264850" y="4975860"/>
+            <a:ext cx="7211613" cy="1619450"/>
           </a:xfrm>
           <a:prstGeom prst="rect">
             <a:avLst/>
@@ -33788,6 +33758,132 @@
                 <a:sym typeface="Open Sans"/>
               </a:rPr>
               <a:t>The best way to assign permissions are through groups. There will be two groups. The first group contains HR and high level managers. This group has read and write access to all tables including the salary table. The second group contains everyone else in the company. This group has read access only to all tables except the salary table.</a:t>
+            </a:r>
+          </a:p>
+          <a:p>
+            <a:pPr marL="457200" lvl="0" indent="0" algn="l" rtl="0">
+              <a:spcBef>
+                <a:spcPts val="1600"/>
+              </a:spcBef>
+              <a:spcAft>
+                <a:spcPts val="0"/>
+              </a:spcAft>
+              <a:buNone/>
+            </a:pPr>
+            <a:r>
+              <a:rPr lang="en-US" sz="1900" dirty="0">
+                <a:latin typeface="Open Sans"/>
+                <a:ea typeface="Open Sans"/>
+                <a:cs typeface="Open Sans"/>
+                <a:sym typeface="Open Sans"/>
+              </a:rPr>
+              <a:t>If the first group is “</a:t>
+            </a:r>
+            <a:r>
+              <a:rPr lang="en-US" sz="1900" dirty="0" err="1">
+                <a:latin typeface="Open Sans"/>
+                <a:ea typeface="Open Sans"/>
+                <a:cs typeface="Open Sans"/>
+                <a:sym typeface="Open Sans"/>
+              </a:rPr>
+              <a:t>hr_manager_group</a:t>
+            </a:r>
+            <a:r>
+              <a:rPr lang="en-US" sz="1900" dirty="0">
+                <a:latin typeface="Open Sans"/>
+                <a:ea typeface="Open Sans"/>
+                <a:cs typeface="Open Sans"/>
+                <a:sym typeface="Open Sans"/>
+              </a:rPr>
+              <a:t>” and the second is “</a:t>
+            </a:r>
+            <a:r>
+              <a:rPr lang="en-US" sz="1900" dirty="0" err="1">
+                <a:latin typeface="Open Sans"/>
+                <a:ea typeface="Open Sans"/>
+                <a:cs typeface="Open Sans"/>
+                <a:sym typeface="Open Sans"/>
+              </a:rPr>
+              <a:t>employee_group</a:t>
+            </a:r>
+            <a:r>
+              <a:rPr lang="en-US" sz="1900" dirty="0">
+                <a:latin typeface="Open Sans"/>
+                <a:ea typeface="Open Sans"/>
+                <a:cs typeface="Open Sans"/>
+                <a:sym typeface="Open Sans"/>
+              </a:rPr>
+              <a:t>” then the commands below would be used to implement this security restriction:</a:t>
+            </a:r>
+          </a:p>
+          <a:p>
+            <a:pPr indent="0">
+              <a:spcBef>
+                <a:spcPts val="1600"/>
+              </a:spcBef>
+              <a:buNone/>
+            </a:pPr>
+            <a:r>
+              <a:rPr lang="en-US" sz="1900" dirty="0">
+                <a:latin typeface="Open Sans"/>
+                <a:ea typeface="Open Sans"/>
+                <a:cs typeface="Open Sans"/>
+                <a:sym typeface="Open Sans"/>
+              </a:rPr>
+              <a:t>revoke SELECT on salary from </a:t>
+            </a:r>
+            <a:r>
+              <a:rPr lang="en-US" sz="1900" dirty="0" err="1">
+                <a:latin typeface="Open Sans"/>
+                <a:ea typeface="Open Sans"/>
+                <a:cs typeface="Open Sans"/>
+                <a:sym typeface="Open Sans"/>
+              </a:rPr>
+              <a:t>employee_group</a:t>
+            </a:r>
+            <a:r>
+              <a:rPr lang="en-US" sz="1900" dirty="0">
+                <a:latin typeface="Open Sans"/>
+                <a:ea typeface="Open Sans"/>
+                <a:cs typeface="Open Sans"/>
+                <a:sym typeface="Open Sans"/>
+              </a:rPr>
+              <a:t> ;</a:t>
+            </a:r>
+          </a:p>
+          <a:p>
+            <a:pPr indent="0">
+              <a:spcBef>
+                <a:spcPts val="1600"/>
+              </a:spcBef>
+              <a:buNone/>
+            </a:pPr>
+            <a:r>
+              <a:rPr lang="en-US" sz="1900" dirty="0">
+                <a:latin typeface="Open Sans"/>
+                <a:ea typeface="Open Sans"/>
+                <a:cs typeface="Open Sans"/>
+                <a:sym typeface="Open Sans"/>
+              </a:rPr>
+              <a:t>grant SELECT on salary TO </a:t>
+            </a:r>
+            <a:r>
+              <a:rPr lang="en-US" sz="1900" dirty="0" err="1">
+                <a:latin typeface="Open Sans"/>
+                <a:ea typeface="Open Sans"/>
+                <a:cs typeface="Open Sans"/>
+                <a:sym typeface="Open Sans"/>
+              </a:rPr>
+              <a:t>hr_manager_group</a:t>
+            </a:r>
+            <a:r>
+              <a:rPr lang="en-US" sz="1900" dirty="0">
+                <a:latin typeface="Open Sans"/>
+                <a:ea typeface="Open Sans"/>
+                <a:cs typeface="Open Sans"/>
+                <a:sym typeface="Open Sans"/>
+              </a:rPr>
+              <a:t>;</a:t>
             </a:r>
             <a:endParaRPr sz="1900" dirty="0">
               <a:latin typeface="Open Sans"/>
@@ -37156,39 +37252,6 @@
             <a:endParaRPr lang="en-US" sz="1200" dirty="0"/>
           </a:p>
           <a:p>
-            <a:pPr marL="742950" indent="-285750">
-              <a:lnSpc>
-                <a:spcPct val="100000"/>
-              </a:lnSpc>
-              <a:spcBef>
-                <a:spcPts val="1600"/>
-              </a:spcBef>
-              <a:buFont typeface="Arial" panose="020B0604020202020204" pitchFamily="34" charset="0"/>
-              <a:buChar char="•"/>
-            </a:pPr>
-            <a:r>
-              <a:rPr lang="en-US" sz="1200" dirty="0"/>
-              <a:t>City</a:t>
-            </a:r>
-          </a:p>
-          <a:p>
-            <a:pPr marL="742950" indent="-285750">
-              <a:lnSpc>
-                <a:spcPct val="100000"/>
-              </a:lnSpc>
-              <a:spcBef>
-                <a:spcPts val="1600"/>
-              </a:spcBef>
-              <a:buFont typeface="Arial" panose="020B0604020202020204" pitchFamily="34" charset="0"/>
-              <a:buChar char="•"/>
-            </a:pPr>
-            <a:r>
-              <a:rPr lang="en-US" sz="1200" dirty="0"/>
-              <a:t>State</a:t>
-            </a:r>
-            <a:endParaRPr sz="1200" dirty="0"/>
-          </a:p>
-          <a:p>
             <a:pPr marL="457200" lvl="0" indent="-349250" algn="l" rtl="0">
               <a:spcBef>
                 <a:spcPts val="1600"/>
@@ -37574,16 +37637,10 @@
             </a:endParaRPr>
           </a:p>
           <a:p>
-            <a:pPr marL="457200" lvl="0" indent="0" algn="l" rtl="0">
-              <a:lnSpc>
-                <a:spcPct val="100000"/>
-              </a:lnSpc>
-              <a:spcBef>
-                <a:spcPts val="1600"/>
-              </a:spcBef>
-              <a:spcAft>
-                <a:spcPts val="0"/>
-              </a:spcAft>
+            <a:pPr lvl="0" indent="0">
+              <a:lnSpc>
+                <a:spcPct val="100000"/>
+              </a:lnSpc>
               <a:buNone/>
             </a:pPr>
             <a:r>
@@ -37596,19 +37653,24 @@
               <a:t>Storage (disk or in-memory): </a:t>
             </a:r>
             <a:r>
-              <a:rPr lang="en" sz="1700" dirty="0"/>
-              <a:t>check </a:t>
+              <a:rPr lang="en" sz="1700" dirty="0">
+                <a:latin typeface="Open Sans"/>
+                <a:ea typeface="Open Sans"/>
+                <a:cs typeface="Open Sans"/>
+                <a:sym typeface="Open Sans"/>
+              </a:rPr>
+              <a:t>We will use disk storage. </a:t>
             </a:r>
             <a:r>
-              <a:rPr lang="en" sz="1700" u="sng" dirty="0">
-                <a:solidFill>
-                  <a:schemeClr val="hlink"/>
-                </a:solidFill>
-                <a:hlinkClick r:id="rId3"/>
+              <a:rPr lang="en-US" sz="1700" dirty="0">
+                <a:latin typeface="Open Sans"/>
+                <a:ea typeface="Open Sans"/>
+                <a:cs typeface="Open Sans"/>
+                <a:sym typeface="Open Sans"/>
               </a:rPr>
-              <a:t>IT best practices document</a:t>
+              <a:t>In memory storage is fast but expensive and not necessary for this project.</a:t>
             </a:r>
-            <a:endParaRPr sz="1700" dirty="0"/>
+            <a:endParaRPr lang="en-US" sz="1700" dirty="0"/>
           </a:p>
           <a:p>
             <a:pPr marL="457200" lvl="0" indent="0" algn="l" rtl="0">
@@ -37656,30 +37718,6 @@
               </a:rPr>
               <a:t>Data has to be kept 7 years per regulation.</a:t>
             </a:r>
-          </a:p>
-          <a:p>
-            <a:pPr marL="457200" lvl="0" indent="0" algn="l" rtl="0">
-              <a:lnSpc>
-                <a:spcPct val="100000"/>
-              </a:lnSpc>
-              <a:spcBef>
-                <a:spcPts val="0"/>
-              </a:spcBef>
-              <a:spcAft>
-                <a:spcPts val="0"/>
-              </a:spcAft>
-              <a:buNone/>
-            </a:pPr>
-            <a:r>
-              <a:rPr lang="en" sz="1700" dirty="0">
-                <a:latin typeface="Open Sans"/>
-                <a:ea typeface="Open Sans"/>
-                <a:cs typeface="Open Sans"/>
-                <a:sym typeface="Open Sans"/>
-              </a:rPr>
-              <a:t>In memory storage is expensive and not necessary for this project.</a:t>
-            </a:r>
-            <a:endParaRPr sz="1700" dirty="0"/>
           </a:p>
           <a:p>
             <a:pPr marL="457200" lvl="0" indent="0" algn="l" rtl="0">

</xml_diff>